<commit_message>
Update the project picture
</commit_message>
<xml_diff>
--- a/present_python.pptx
+++ b/present_python.pptx
@@ -5737,7 +5737,7 @@
         </p:blipFill>
         <p:spPr bwMode="auto">
           <a:xfrm flipH="0" flipV="0">
-            <a:off x="759246" y="4296526"/>
+            <a:off x="759245" y="4296526"/>
             <a:ext cx="1821771" cy="1800000"/>
           </a:xfrm>
           <a:prstGeom prst="rect">
@@ -5825,7 +5825,7 @@
         </p:blipFill>
         <p:spPr bwMode="auto">
           <a:xfrm flipH="0" flipV="0">
-            <a:off x="759246" y="2004167"/>
+            <a:off x="759245" y="2004167"/>
             <a:ext cx="2197892" cy="1800000"/>
           </a:xfrm>
           <a:prstGeom prst="rect">
@@ -6508,60 +6508,9 @@
           <a:chExt cx="0" cy="0"/>
         </a:xfrm>
       </p:grpSpPr>
-      <p:sp>
-        <p:nvSpPr>
-          <p:cNvPr id="4" name="Title 1" hidden="0"/>
-          <p:cNvSpPr>
-            <a:spLocks noGrp="1"/>
-          </p:cNvSpPr>
-          <p:nvPr isPhoto="0" userDrawn="0">
-            <p:ph type="title" hasCustomPrompt="0"/>
-          </p:nvPr>
-        </p:nvSpPr>
-        <p:spPr bwMode="auto"/>
-        <p:txBody>
-          <a:bodyPr/>
-          <a:lstStyle/>
-          <a:p>
-            <a:pPr>
-              <a:defRPr/>
-            </a:pPr>
-            <a:r>
-              <a:rPr/>
-              <a:t>        Le contenu du projet</a:t>
-            </a:r>
-            <a:endParaRPr/>
-          </a:p>
-        </p:txBody>
-      </p:sp>
-      <p:sp>
-        <p:nvSpPr>
-          <p:cNvPr id="5" name="" hidden="0"/>
-          <p:cNvSpPr/>
-          <p:nvPr isPhoto="0" userDrawn="0"/>
-        </p:nvSpPr>
-        <p:spPr bwMode="auto">
-          <a:xfrm flipH="0" flipV="0">
-            <a:off x="7568389" y="4292313"/>
-            <a:ext cx="109899" cy="740440"/>
-          </a:xfrm>
-        </p:spPr>
-        <p:txBody>
-          <a:bodyPr rot="0" spcFirstLastPara="0" vertOverflow="overflow" horzOverflow="clip" vert="horz" wrap="square" lIns="91440" tIns="45720" rIns="91440" bIns="45720" numCol="1" spcCol="0" rtlCol="0" fromWordArt="0" anchor="t" anchorCtr="0" forceAA="0" upright="0" compatLnSpc="1">
-            <a:prstTxWarp prst="textNoShape"/>
-            <a:noAutofit/>
-          </a:bodyPr>
-          <a:p>
-            <a:pPr>
-              <a:defRPr/>
-            </a:pPr>
-            <a:endParaRPr/>
-          </a:p>
-        </p:txBody>
-      </p:sp>
       <p:pic>
         <p:nvPicPr>
-          <p:cNvPr id="6" name="" hidden="0"/>
+          <p:cNvPr id="4" name="" hidden="0"/>
           <p:cNvPicPr>
             <a:picLocks noChangeAspect="1"/>
           </p:cNvPicPr>
@@ -6573,8 +6522,8 @@
         </p:blipFill>
         <p:spPr bwMode="auto">
           <a:xfrm flipH="0" flipV="0">
-            <a:off x="749052" y="2127819"/>
-            <a:ext cx="5087111" cy="4038079"/>
+            <a:off x="240436" y="2034128"/>
+            <a:ext cx="4911407" cy="4593817"/>
           </a:xfrm>
           <a:prstGeom prst="rect">
             <a:avLst/>
@@ -6583,13 +6532,64 @@
       </p:pic>
       <p:sp>
         <p:nvSpPr>
+          <p:cNvPr id="5" name="Title 1" hidden="0"/>
+          <p:cNvSpPr>
+            <a:spLocks noGrp="1"/>
+          </p:cNvSpPr>
+          <p:nvPr isPhoto="0" userDrawn="0">
+            <p:ph type="title" hasCustomPrompt="0"/>
+          </p:nvPr>
+        </p:nvSpPr>
+        <p:spPr bwMode="auto"/>
+        <p:txBody>
+          <a:bodyPr/>
+          <a:lstStyle/>
+          <a:p>
+            <a:pPr>
+              <a:defRPr/>
+            </a:pPr>
+            <a:r>
+              <a:rPr/>
+              <a:t>        Le contenu du projet</a:t>
+            </a:r>
+            <a:endParaRPr/>
+          </a:p>
+        </p:txBody>
+      </p:sp>
+      <p:sp>
+        <p:nvSpPr>
+          <p:cNvPr id="6" name="" hidden="0"/>
+          <p:cNvSpPr/>
+          <p:nvPr isPhoto="0" userDrawn="0"/>
+        </p:nvSpPr>
+        <p:spPr bwMode="auto">
+          <a:xfrm flipH="0" flipV="0">
+            <a:off x="7568389" y="4292313"/>
+            <a:ext cx="109899" cy="740440"/>
+          </a:xfrm>
+        </p:spPr>
+        <p:txBody>
+          <a:bodyPr rot="0" spcFirstLastPara="0" vertOverflow="overflow" horzOverflow="clip" vert="horz" wrap="square" lIns="91440" tIns="45720" rIns="91440" bIns="45720" numCol="1" spcCol="0" rtlCol="0" fromWordArt="0" anchor="t" anchorCtr="0" forceAA="0" upright="0" compatLnSpc="1">
+            <a:prstTxWarp prst="textNoShape"/>
+            <a:noAutofit/>
+          </a:bodyPr>
+          <a:p>
+            <a:pPr>
+              <a:defRPr/>
+            </a:pPr>
+            <a:endParaRPr/>
+          </a:p>
+        </p:txBody>
+      </p:sp>
+      <p:sp>
+        <p:nvSpPr>
           <p:cNvPr id="7" name="" hidden="0"/>
           <p:cNvSpPr/>
           <p:nvPr isPhoto="0" userDrawn="0"/>
         </p:nvSpPr>
         <p:spPr bwMode="auto">
           <a:xfrm flipH="0" flipV="0">
-            <a:off x="6492742" y="4623786"/>
+            <a:off x="6513877" y="4806683"/>
             <a:ext cx="2109022" cy="365795"/>
           </a:xfrm>
           <a:prstGeom prst="rect">
@@ -6685,7 +6685,7 @@
         </p:nvSpPr>
         <p:spPr bwMode="auto">
           <a:xfrm flipH="0" flipV="0">
-            <a:off x="6603713" y="5206383"/>
+            <a:off x="6603712" y="5631772"/>
             <a:ext cx="3097936" cy="406892"/>
           </a:xfrm>
           <a:prstGeom prst="rect">
@@ -6717,7 +6717,7 @@
         </p:nvSpPr>
         <p:spPr bwMode="auto">
           <a:xfrm flipH="0" flipV="0">
-            <a:off x="6566723" y="5927694"/>
+            <a:off x="6566722" y="6140387"/>
             <a:ext cx="2073112" cy="640115"/>
           </a:xfrm>
           <a:prstGeom prst="rect">
@@ -6751,9 +6751,9 @@
           <p:nvPr isPhoto="0" userDrawn="0"/>
         </p:nvCxnSpPr>
         <p:spPr bwMode="auto">
-          <a:xfrm rot="10799989" flipH="0" flipV="0">
-            <a:off x="2497791" y="2376626"/>
-            <a:ext cx="4300121" cy="157208"/>
+          <a:xfrm rot="10799990" flipH="0" flipV="0">
+            <a:off x="1831965" y="2237912"/>
+            <a:ext cx="4965945" cy="295920"/>
           </a:xfrm>
           <a:prstGeom prst="line">
             <a:avLst/>
@@ -6794,9 +6794,9 @@
           <p:nvPr isPhoto="0" userDrawn="0"/>
         </p:nvCxnSpPr>
         <p:spPr bwMode="auto">
-          <a:xfrm rot="10799989" flipH="0" flipV="0">
-            <a:off x="4208591" y="3356868"/>
-            <a:ext cx="2515339" cy="477266"/>
+          <a:xfrm rot="10799990" flipH="0" flipV="0">
+            <a:off x="3515024" y="3162669"/>
+            <a:ext cx="3208906" cy="671464"/>
           </a:xfrm>
           <a:prstGeom prst="line">
             <a:avLst/>
@@ -6837,8 +6837,8 @@
         </p:nvCxnSpPr>
         <p:spPr bwMode="auto">
           <a:xfrm rot="10799989" flipH="0" flipV="0">
-            <a:off x="4153106" y="3834133"/>
-            <a:ext cx="2570824" cy="0"/>
+            <a:off x="3468786" y="3597300"/>
+            <a:ext cx="3255142" cy="236833"/>
           </a:xfrm>
           <a:prstGeom prst="line">
             <a:avLst/>
@@ -6879,8 +6879,8 @@
         </p:nvCxnSpPr>
         <p:spPr bwMode="auto">
           <a:xfrm rot="10799989" flipH="0" flipV="1">
-            <a:off x="4134611" y="3834133"/>
-            <a:ext cx="2589319" cy="558462"/>
+            <a:off x="3357815" y="3834133"/>
+            <a:ext cx="3366114" cy="225544"/>
           </a:xfrm>
           <a:prstGeom prst="line">
             <a:avLst/>
@@ -6921,9 +6921,9 @@
           <p:nvPr isPhoto="0" userDrawn="0"/>
         </p:nvCxnSpPr>
         <p:spPr bwMode="auto">
-          <a:xfrm rot="10799989" flipH="0" flipV="1">
-            <a:off x="3644490" y="4806684"/>
-            <a:ext cx="2848252" cy="29796"/>
+          <a:xfrm rot="10799990" flipH="0" flipV="0">
+            <a:off x="2997159" y="4938203"/>
+            <a:ext cx="3516717" cy="51377"/>
           </a:xfrm>
           <a:prstGeom prst="line">
             <a:avLst/>
@@ -6964,9 +6964,9 @@
           <p:nvPr isPhoto="0" userDrawn="0"/>
         </p:nvCxnSpPr>
         <p:spPr bwMode="auto">
-          <a:xfrm rot="10799989" flipH="0" flipV="0">
-            <a:off x="4541504" y="5363592"/>
-            <a:ext cx="2062208" cy="46237"/>
+          <a:xfrm rot="10799990" flipH="0" flipV="0">
+            <a:off x="3820194" y="5816723"/>
+            <a:ext cx="2783518" cy="18495"/>
           </a:xfrm>
           <a:prstGeom prst="line">
             <a:avLst/>
@@ -7007,9 +7007,9 @@
           <p:nvPr isPhoto="0" userDrawn="0"/>
         </p:nvCxnSpPr>
         <p:spPr bwMode="auto">
-          <a:xfrm rot="10799989" flipH="0" flipV="0">
-            <a:off x="3579757" y="5853713"/>
-            <a:ext cx="2986965" cy="394037"/>
+          <a:xfrm rot="10799990" flipH="0" flipV="0">
+            <a:off x="2904684" y="6297596"/>
+            <a:ext cx="3662038" cy="162848"/>
           </a:xfrm>
           <a:prstGeom prst="line">
             <a:avLst/>
@@ -7017,6 +7017,156 @@
           <a:ln w="38099" cap="flat" cmpd="sng" algn="ctr">
             <a:solidFill>
               <a:srgbClr val="92D050"/>
+            </a:solidFill>
+            <a:prstDash val="solid"/>
+            <a:miter/>
+            <a:tailEnd type="arrow" len="med"/>
+          </a:ln>
+        </p:spPr>
+        <p:style>
+          <a:lnRef idx="1">
+            <a:schemeClr val="accent1">
+              <a:shade val="50000"/>
+            </a:schemeClr>
+          </a:lnRef>
+          <a:fillRef idx="0">
+            <a:schemeClr val="accent1"/>
+          </a:fillRef>
+          <a:effectRef idx="0">
+            <a:schemeClr val="accent1"/>
+          </a:effectRef>
+          <a:fontRef idx="minor">
+            <a:schemeClr val="tx1"/>
+          </a:fontRef>
+        </p:style>
+      </p:cxnSp>
+      <p:sp>
+        <p:nvSpPr>
+          <p:cNvPr id="19" name="" hidden="0"/>
+          <p:cNvSpPr/>
+          <p:nvPr isPhoto="0" userDrawn="0"/>
+        </p:nvSpPr>
+        <p:spPr bwMode="auto">
+          <a:xfrm flipH="0" flipV="0">
+            <a:off x="6437256" y="5257761"/>
+            <a:ext cx="3523325" cy="374011"/>
+          </a:xfrm>
+          <a:prstGeom prst="rect">
+            <a:avLst/>
+          </a:prstGeom>
+          <a:noFill/>
+        </p:spPr>
+        <p:txBody>
+          <a:bodyPr vertOverflow="overflow" horzOverflow="clip" vert="horz" wrap="square" lIns="91440" tIns="45720" rIns="91440" bIns="45720" numCol="1" spcCol="0" rtlCol="0" fromWordArt="0" anchor="t" anchorCtr="0" forceAA="0" upright="0" compatLnSpc="0">
+            <a:noAutofit/>
+          </a:bodyPr>
+          <a:p>
+            <a:pPr>
+              <a:defRPr/>
+            </a:pPr>
+            <a:r>
+              <a:rPr/>
+              <a:t>La présentation au format PDF</a:t>
+            </a:r>
+            <a:endParaRPr/>
+          </a:p>
+        </p:txBody>
+      </p:sp>
+      <p:cxnSp>
+        <p:nvCxnSpPr>
+          <p:cNvPr id="20" name="" hidden="0"/>
+          <p:cNvCxnSpPr>
+            <a:cxnSpLocks/>
+            <a:stCxn id="19" idx="1"/>
+          </p:cNvCxnSpPr>
+          <p:nvPr isPhoto="0" userDrawn="0"/>
+        </p:nvCxnSpPr>
+        <p:spPr bwMode="auto">
+          <a:xfrm rot="10799990" flipH="0" flipV="0">
+            <a:off x="3727718" y="5382087"/>
+            <a:ext cx="2709538" cy="62679"/>
+          </a:xfrm>
+          <a:prstGeom prst="line">
+            <a:avLst/>
+          </a:prstGeom>
+          <a:ln w="38099" cap="flat" cmpd="sng" algn="ctr">
+            <a:solidFill>
+              <a:srgbClr val="FF0000"/>
+            </a:solidFill>
+            <a:prstDash val="solid"/>
+            <a:miter/>
+            <a:tailEnd type="arrow" len="med"/>
+          </a:ln>
+        </p:spPr>
+        <p:style>
+          <a:lnRef idx="1">
+            <a:schemeClr val="accent1">
+              <a:shade val="50000"/>
+            </a:schemeClr>
+          </a:lnRef>
+          <a:fillRef idx="0">
+            <a:schemeClr val="accent1"/>
+          </a:fillRef>
+          <a:effectRef idx="0">
+            <a:schemeClr val="accent1"/>
+          </a:effectRef>
+          <a:fontRef idx="minor">
+            <a:schemeClr val="tx1"/>
+          </a:fontRef>
+        </p:style>
+      </p:cxnSp>
+      <p:sp>
+        <p:nvSpPr>
+          <p:cNvPr id="21" name="" hidden="0"/>
+          <p:cNvSpPr/>
+          <p:nvPr isPhoto="0" userDrawn="0"/>
+        </p:nvSpPr>
+        <p:spPr bwMode="auto">
+          <a:xfrm flipH="0" flipV="0">
+            <a:off x="6910203" y="4296736"/>
+            <a:ext cx="5149577" cy="419524"/>
+          </a:xfrm>
+          <a:prstGeom prst="rect">
+            <a:avLst/>
+          </a:prstGeom>
+          <a:noFill/>
+        </p:spPr>
+        <p:txBody>
+          <a:bodyPr vertOverflow="overflow" horzOverflow="clip" vert="horz" wrap="square" lIns="91440" tIns="45720" rIns="91440" bIns="45720" numCol="1" spcCol="0" rtlCol="0" fromWordArt="0" anchor="t" anchorCtr="0" forceAA="0" upright="0" compatLnSpc="0">
+            <a:noAutofit/>
+          </a:bodyPr>
+          <a:p>
+            <a:pPr>
+              <a:defRPr/>
+            </a:pPr>
+            <a:r>
+              <a:rPr/>
+              <a:t>Le script de la diapo « Un code tout simple »</a:t>
+            </a:r>
+            <a:endParaRPr/>
+          </a:p>
+        </p:txBody>
+      </p:sp>
+      <p:cxnSp>
+        <p:nvCxnSpPr>
+          <p:cNvPr id="22" name="" hidden="0"/>
+          <p:cNvCxnSpPr>
+            <a:cxnSpLocks/>
+            <a:stCxn id="21" idx="1"/>
+          </p:cNvCxnSpPr>
+          <p:nvPr isPhoto="0" userDrawn="0"/>
+        </p:nvCxnSpPr>
+        <p:spPr bwMode="auto">
+          <a:xfrm rot="10799990" flipH="0" flipV="1">
+            <a:off x="3810946" y="4506499"/>
+            <a:ext cx="3099257" cy="24810"/>
+          </a:xfrm>
+          <a:prstGeom prst="line">
+            <a:avLst/>
+          </a:prstGeom>
+          <a:ln w="38099" cap="flat" cmpd="sng" algn="ctr">
+            <a:solidFill>
+              <a:srgbClr val="00B0F0"/>
             </a:solidFill>
             <a:prstDash val="solid"/>
             <a:miter/>

</xml_diff>

<commit_message>
Modify the time of the transition
</commit_message>
<xml_diff>
--- a/present_python.pptx
+++ b/present_python.pptx
@@ -5228,7 +5228,7 @@
   </p:clrMapOvr>
   <mc:AlternateContent xmlns:mc="http://schemas.openxmlformats.org/markup-compatibility/2006">
     <mc:Choice xmlns:p14="http://schemas.microsoft.com/office/powerpoint/2010/main" Requires="p14">
-      <p:transition spd="med" p14:dur="1000" advClick="1">
+      <p:transition spd="med" p14:dur="800" advClick="1">
         <p14:warp dir="in"/>
       </p:transition>
     </mc:Choice>
@@ -5565,7 +5565,7 @@
   </p:clrMapOvr>
   <mc:AlternateContent xmlns:mc="http://schemas.openxmlformats.org/markup-compatibility/2006">
     <mc:Choice xmlns:p14="http://schemas.microsoft.com/office/powerpoint/2010/main" Requires="p14">
-      <p:transition spd="med" p14:dur="1000" advClick="1">
+      <p:transition spd="med" p14:dur="800" advClick="1">
         <p14:warp dir="in"/>
       </p:transition>
     </mc:Choice>
@@ -5658,7 +5658,7 @@
   </p:clrMapOvr>
   <mc:AlternateContent xmlns:mc="http://schemas.openxmlformats.org/markup-compatibility/2006">
     <mc:Choice xmlns:p14="http://schemas.microsoft.com/office/powerpoint/2010/main" Requires="p14">
-      <p:transition spd="med" p14:dur="1000" advClick="1">
+      <p:transition spd="med" p14:dur="800" advClick="1">
         <p14:warp dir="in"/>
       </p:transition>
     </mc:Choice>
@@ -5888,7 +5888,7 @@
   </p:clrMapOvr>
   <mc:AlternateContent xmlns:mc="http://schemas.openxmlformats.org/markup-compatibility/2006">
     <mc:Choice xmlns:p14="http://schemas.microsoft.com/office/powerpoint/2010/main" Requires="p14">
-      <p:transition spd="med" p14:dur="1000" advClick="1">
+      <p:transition spd="med" p14:dur="800" advClick="1">
         <p14:warp dir="in"/>
       </p:transition>
     </mc:Choice>
@@ -6300,7 +6300,7 @@
   </p:clrMapOvr>
   <mc:AlternateContent xmlns:mc="http://schemas.openxmlformats.org/markup-compatibility/2006">
     <mc:Choice xmlns:p14="http://schemas.microsoft.com/office/powerpoint/2010/main" Requires="p14">
-      <p:transition spd="med" p14:dur="1000" advClick="1">
+      <p:transition spd="med" p14:dur="800" advClick="1">
         <p14:warp dir="in"/>
       </p:transition>
     </mc:Choice>
@@ -6518,7 +6518,7 @@
   </p:clrMapOvr>
   <mc:AlternateContent xmlns:mc="http://schemas.openxmlformats.org/markup-compatibility/2006">
     <mc:Choice xmlns:p14="http://schemas.microsoft.com/office/powerpoint/2010/main" Requires="p14">
-      <p:transition spd="med" p14:dur="1000" advClick="1">
+      <p:transition spd="med" p14:dur="800" advClick="1">
         <p14:warp dir="in"/>
       </p:transition>
     </mc:Choice>
@@ -6799,7 +6799,7 @@
           <p:nvPr isPhoto="0" userDrawn="0"/>
         </p:nvCxnSpPr>
         <p:spPr bwMode="auto">
-          <a:xfrm rot="10799990" flipH="0" flipV="0">
+          <a:xfrm rot="10799989" flipH="0" flipV="0">
             <a:off x="1831965" y="2237912"/>
             <a:ext cx="4965945" cy="295920"/>
           </a:xfrm>
@@ -6842,7 +6842,7 @@
           <p:nvPr isPhoto="0" userDrawn="0"/>
         </p:nvCxnSpPr>
         <p:spPr bwMode="auto">
-          <a:xfrm rot="10799990" flipH="0" flipV="0">
+          <a:xfrm rot="10799989" flipH="0" flipV="0">
             <a:off x="3515024" y="3162669"/>
             <a:ext cx="3208906" cy="671464"/>
           </a:xfrm>
@@ -6969,7 +6969,7 @@
           <p:nvPr isPhoto="0" userDrawn="0"/>
         </p:nvCxnSpPr>
         <p:spPr bwMode="auto">
-          <a:xfrm rot="10799990" flipH="0" flipV="0">
+          <a:xfrm rot="10799989" flipH="0" flipV="0">
             <a:off x="2997159" y="4938203"/>
             <a:ext cx="3516717" cy="51377"/>
           </a:xfrm>
@@ -7012,8 +7012,8 @@
           <p:nvPr isPhoto="0" userDrawn="0"/>
         </p:nvCxnSpPr>
         <p:spPr bwMode="auto">
-          <a:xfrm rot="10799990" flipH="0" flipV="0">
-            <a:off x="3820194" y="5816723"/>
+          <a:xfrm rot="10799989" flipH="0" flipV="0">
+            <a:off x="3820194" y="5816722"/>
             <a:ext cx="2783518" cy="18495"/>
           </a:xfrm>
           <a:prstGeom prst="line">
@@ -7055,7 +7055,7 @@
           <p:nvPr isPhoto="0" userDrawn="0"/>
         </p:nvCxnSpPr>
         <p:spPr bwMode="auto">
-          <a:xfrm rot="10799990" flipH="0" flipV="0">
+          <a:xfrm rot="10799989" flipH="0" flipV="0">
             <a:off x="2904684" y="6297596"/>
             <a:ext cx="3662038" cy="162848"/>
           </a:xfrm>
@@ -7130,7 +7130,7 @@
           <p:nvPr isPhoto="0" userDrawn="0"/>
         </p:nvCxnSpPr>
         <p:spPr bwMode="auto">
-          <a:xfrm rot="10799990" flipH="0" flipV="0">
+          <a:xfrm rot="10799989" flipH="0" flipV="0">
             <a:off x="3727718" y="5382087"/>
             <a:ext cx="2709538" cy="62679"/>
           </a:xfrm>
@@ -7205,7 +7205,7 @@
           <p:nvPr isPhoto="0" userDrawn="0"/>
         </p:nvCxnSpPr>
         <p:spPr bwMode="auto">
-          <a:xfrm rot="10799990" flipH="0" flipV="1">
+          <a:xfrm rot="10799989" flipH="0" flipV="1">
             <a:off x="3810946" y="4506499"/>
             <a:ext cx="3099257" cy="24810"/>
           </a:xfrm>
@@ -7245,7 +7245,7 @@
   </p:clrMapOvr>
   <mc:AlternateContent xmlns:mc="http://schemas.openxmlformats.org/markup-compatibility/2006">
     <mc:Choice xmlns:p14="http://schemas.microsoft.com/office/powerpoint/2010/main" Requires="p14">
-      <p:transition spd="med" p14:dur="1000" advClick="1">
+      <p:transition spd="med" p14:dur="800" advClick="1">
         <p14:warp dir="in"/>
       </p:transition>
     </mc:Choice>
@@ -7737,7 +7737,7 @@
   </p:clrMapOvr>
   <mc:AlternateContent xmlns:mc="http://schemas.openxmlformats.org/markup-compatibility/2006">
     <mc:Choice xmlns:p14="http://schemas.microsoft.com/office/powerpoint/2010/main" Requires="p14">
-      <p:transition spd="med" p14:dur="1000" advClick="1">
+      <p:transition spd="med" p14:dur="800" advClick="1">
         <p14:warp dir="in"/>
       </p:transition>
     </mc:Choice>
@@ -7941,7 +7941,7 @@
   </p:clrMapOvr>
   <mc:AlternateContent xmlns:mc="http://schemas.openxmlformats.org/markup-compatibility/2006">
     <mc:Choice xmlns:p14="http://schemas.microsoft.com/office/powerpoint/2010/main" Requires="p14">
-      <p:transition spd="med" p14:dur="1000" advClick="1">
+      <p:transition spd="med" p14:dur="800" advClick="1">
         <p14:warp dir="in"/>
       </p:transition>
     </mc:Choice>

</xml_diff>

<commit_message>
Add images of the code
</commit_message>
<xml_diff>
--- a/present_python.pptx
+++ b/present_python.pptx
@@ -5,7 +5,7 @@
     <p:sldMasterId id="2147483648" r:id="rId1"/>
   </p:sldMasterIdLst>
   <p:notesMasterIdLst>
-    <p:notesMasterId r:id="rId13"/>
+    <p:notesMasterId r:id="rId19"/>
   </p:notesMasterIdLst>
   <p:sldIdLst>
     <p:sldId id="256" r:id="rId4"/>
@@ -17,6 +17,12 @@
     <p:sldId id="262" r:id="rId10"/>
     <p:sldId id="263" r:id="rId11"/>
     <p:sldId id="264" r:id="rId12"/>
+    <p:sldId id="265" r:id="rId13"/>
+    <p:sldId id="266" r:id="rId14"/>
+    <p:sldId id="267" r:id="rId15"/>
+    <p:sldId id="268" r:id="rId16"/>
+    <p:sldId id="269" r:id="rId17"/>
+    <p:sldId id="270" r:id="rId18"/>
   </p:sldIdLst>
   <p:sldSz cx="12192000" cy="6858000"/>
   <p:notesSz cx="6858000" cy="12192000"/>
@@ -5241,6 +5247,685 @@
 </p:sld>
 </file>
 
+<file path=ppt/slides/slide10.xml><?xml version="1.0" encoding="utf-8"?>
+<p:sld xmlns:a="http://schemas.openxmlformats.org/drawingml/2006/main" xmlns:r="http://schemas.openxmlformats.org/officeDocument/2006/relationships" xmlns:p="http://schemas.openxmlformats.org/presentationml/2006/main" xmlns:m="http://schemas.openxmlformats.org/officeDocument/2006/math" xmlns:w="http://schemas.openxmlformats.org/wordprocessingml/2006/main" showMasterPhAnim="0" show="1">
+  <p:cSld name="">
+    <p:bg>
+      <p:bgPr shadeToTitle="0">
+        <a:blipFill>
+          <a:blip r:embed="rId2"/>
+          <a:stretch/>
+        </a:blipFill>
+      </p:bgPr>
+    </p:bg>
+    <p:spTree>
+      <p:nvGrpSpPr>
+        <p:cNvPr id="1" name="" hidden="0"/>
+        <p:cNvGrpSpPr/>
+        <p:nvPr isPhoto="0" userDrawn="0"/>
+      </p:nvGrpSpPr>
+      <p:grpSpPr bwMode="auto">
+        <a:xfrm>
+          <a:off x="0" y="0"/>
+          <a:ext cx="0" cy="0"/>
+          <a:chOff x="0" y="0"/>
+          <a:chExt cx="0" cy="0"/>
+        </a:xfrm>
+      </p:grpSpPr>
+      <p:sp>
+        <p:nvSpPr>
+          <p:cNvPr id="4" name="Title 1" hidden="0"/>
+          <p:cNvSpPr>
+            <a:spLocks noGrp="1"/>
+          </p:cNvSpPr>
+          <p:nvPr isPhoto="0" userDrawn="0">
+            <p:ph type="title" hasCustomPrompt="0"/>
+          </p:nvPr>
+        </p:nvSpPr>
+        <p:spPr bwMode="auto"/>
+        <p:txBody>
+          <a:bodyPr/>
+          <a:lstStyle/>
+          <a:p>
+            <a:pPr>
+              <a:defRPr/>
+            </a:pPr>
+            <a:r>
+              <a:rPr/>
+              <a:t>        Choix de la difficulté</a:t>
+            </a:r>
+            <a:endParaRPr/>
+          </a:p>
+        </p:txBody>
+      </p:sp>
+      <p:pic>
+        <p:nvPicPr>
+          <p:cNvPr id="5" name="" hidden="0"/>
+          <p:cNvPicPr>
+            <a:picLocks noChangeAspect="1"/>
+          </p:cNvPicPr>
+          <p:nvPr isPhoto="0" userDrawn="0">
+            <p:ph idx="1" hasCustomPrompt="0"/>
+          </p:nvPr>
+        </p:nvPicPr>
+        <p:blipFill>
+          <a:blip r:embed="rId3"/>
+          <a:stretch/>
+        </p:blipFill>
+        <p:spPr bwMode="auto">
+          <a:xfrm rot="0" flipH="0" flipV="0">
+            <a:off x="1541052" y="1387135"/>
+            <a:ext cx="9062340" cy="5400582"/>
+          </a:xfrm>
+          <a:prstGeom prst="rect">
+            <a:avLst/>
+          </a:prstGeom>
+        </p:spPr>
+      </p:pic>
+    </p:spTree>
+  </p:cSld>
+  <p:clrMapOvr>
+    <a:masterClrMapping/>
+  </p:clrMapOvr>
+  <mc:AlternateContent xmlns:mc="http://schemas.openxmlformats.org/markup-compatibility/2006">
+    <mc:Choice xmlns:p14="http://schemas.microsoft.com/office/powerpoint/2010/main" Requires="p14">
+      <p:transition spd="med" p14:dur="800" advClick="1">
+        <p14:warp dir="in"/>
+      </p:transition>
+    </mc:Choice>
+    <mc:Fallback>
+      <p:transition spd="med" advClick="1">
+        <p:fade/>
+      </p:transition>
+    </mc:Fallback>
+  </mc:AlternateContent>
+</p:sld>
+</file>
+
+<file path=ppt/slides/slide11.xml><?xml version="1.0" encoding="utf-8"?>
+<p:sld xmlns:a="http://schemas.openxmlformats.org/drawingml/2006/main" xmlns:r="http://schemas.openxmlformats.org/officeDocument/2006/relationships" xmlns:p="http://schemas.openxmlformats.org/presentationml/2006/main" xmlns:m="http://schemas.openxmlformats.org/officeDocument/2006/math" xmlns:w="http://schemas.openxmlformats.org/wordprocessingml/2006/main" showMasterPhAnim="0" show="1">
+  <p:cSld name="">
+    <p:bg>
+      <p:bgPr shadeToTitle="0">
+        <a:blipFill>
+          <a:blip r:embed="rId2"/>
+          <a:stretch/>
+        </a:blipFill>
+      </p:bgPr>
+    </p:bg>
+    <p:spTree>
+      <p:nvGrpSpPr>
+        <p:cNvPr id="1" name="" hidden="0"/>
+        <p:cNvGrpSpPr/>
+        <p:nvPr isPhoto="0" userDrawn="0"/>
+      </p:nvGrpSpPr>
+      <p:grpSpPr bwMode="auto">
+        <a:xfrm>
+          <a:off x="0" y="0"/>
+          <a:ext cx="0" cy="0"/>
+          <a:chOff x="0" y="0"/>
+          <a:chExt cx="0" cy="0"/>
+        </a:xfrm>
+      </p:grpSpPr>
+      <p:sp>
+        <p:nvSpPr>
+          <p:cNvPr id="4" name="Title 1" hidden="0"/>
+          <p:cNvSpPr>
+            <a:spLocks noGrp="1"/>
+          </p:cNvSpPr>
+          <p:nvPr isPhoto="0" userDrawn="0">
+            <p:ph type="title" hasCustomPrompt="0"/>
+          </p:nvPr>
+        </p:nvSpPr>
+        <p:spPr bwMode="auto"/>
+        <p:txBody>
+          <a:bodyPr/>
+          <a:lstStyle/>
+          <a:p>
+            <a:pPr>
+              <a:defRPr/>
+            </a:pPr>
+            <a:r>
+              <a:rPr/>
+              <a:t>        Quelques commentaires</a:t>
+            </a:r>
+            <a:endParaRPr/>
+          </a:p>
+        </p:txBody>
+      </p:sp>
+      <p:pic>
+        <p:nvPicPr>
+          <p:cNvPr id="5" name="" hidden="0"/>
+          <p:cNvPicPr>
+            <a:picLocks noChangeAspect="1"/>
+          </p:cNvPicPr>
+          <p:nvPr isPhoto="0" userDrawn="0">
+            <p:ph idx="1" hasCustomPrompt="0"/>
+          </p:nvPr>
+        </p:nvPicPr>
+        <p:blipFill>
+          <a:blip r:embed="rId3"/>
+          <a:stretch/>
+        </p:blipFill>
+        <p:spPr bwMode="auto">
+          <a:xfrm rot="0" flipH="0" flipV="0">
+            <a:off x="130332" y="3116431"/>
+            <a:ext cx="11954600" cy="1766286"/>
+          </a:xfrm>
+          <a:prstGeom prst="rect">
+            <a:avLst/>
+          </a:prstGeom>
+        </p:spPr>
+      </p:pic>
+    </p:spTree>
+  </p:cSld>
+  <p:clrMapOvr>
+    <a:masterClrMapping/>
+  </p:clrMapOvr>
+  <mc:AlternateContent xmlns:mc="http://schemas.openxmlformats.org/markup-compatibility/2006">
+    <mc:Choice xmlns:p14="http://schemas.microsoft.com/office/powerpoint/2010/main" Requires="p14">
+      <p:transition spd="med" p14:dur="800" advClick="1">
+        <p14:warp dir="in"/>
+      </p:transition>
+    </mc:Choice>
+    <mc:Fallback>
+      <p:transition spd="med" advClick="1">
+        <p:fade/>
+      </p:transition>
+    </mc:Fallback>
+  </mc:AlternateContent>
+</p:sld>
+</file>
+
+<file path=ppt/slides/slide12.xml><?xml version="1.0" encoding="utf-8"?>
+<p:sld xmlns:a="http://schemas.openxmlformats.org/drawingml/2006/main" xmlns:r="http://schemas.openxmlformats.org/officeDocument/2006/relationships" xmlns:p="http://schemas.openxmlformats.org/presentationml/2006/main" xmlns:m="http://schemas.openxmlformats.org/officeDocument/2006/math" xmlns:w="http://schemas.openxmlformats.org/wordprocessingml/2006/main" showMasterPhAnim="0" show="1">
+  <p:cSld name="">
+    <p:bg>
+      <p:bgPr shadeToTitle="0">
+        <a:blipFill>
+          <a:blip r:embed="rId2"/>
+          <a:stretch/>
+        </a:blipFill>
+      </p:bgPr>
+    </p:bg>
+    <p:spTree>
+      <p:nvGrpSpPr>
+        <p:cNvPr id="1" name="" hidden="0"/>
+        <p:cNvGrpSpPr/>
+        <p:nvPr isPhoto="0" userDrawn="0"/>
+      </p:nvGrpSpPr>
+      <p:grpSpPr bwMode="auto">
+        <a:xfrm>
+          <a:off x="0" y="0"/>
+          <a:ext cx="0" cy="0"/>
+          <a:chOff x="0" y="0"/>
+          <a:chExt cx="0" cy="0"/>
+        </a:xfrm>
+      </p:grpSpPr>
+      <p:sp>
+        <p:nvSpPr>
+          <p:cNvPr id="4" name="Title 1" hidden="0"/>
+          <p:cNvSpPr>
+            <a:spLocks noGrp="1"/>
+          </p:cNvSpPr>
+          <p:nvPr isPhoto="0" userDrawn="0">
+            <p:ph type="title" hasCustomPrompt="0"/>
+          </p:nvPr>
+        </p:nvSpPr>
+        <p:spPr bwMode="auto"/>
+        <p:txBody>
+          <a:bodyPr/>
+          <a:lstStyle/>
+          <a:p>
+            <a:pPr>
+              <a:defRPr/>
+            </a:pPr>
+            <a:r>
+              <a:rPr/>
+              <a:t>        Affichage des calculs</a:t>
+            </a:r>
+            <a:endParaRPr/>
+          </a:p>
+        </p:txBody>
+      </p:sp>
+      <p:pic>
+        <p:nvPicPr>
+          <p:cNvPr id="5" name="" hidden="0"/>
+          <p:cNvPicPr>
+            <a:picLocks noChangeAspect="1"/>
+          </p:cNvPicPr>
+          <p:nvPr isPhoto="0" userDrawn="0">
+            <p:ph idx="1" hasCustomPrompt="0"/>
+          </p:nvPr>
+        </p:nvPicPr>
+        <p:blipFill>
+          <a:blip r:embed="rId3"/>
+          <a:stretch/>
+        </p:blipFill>
+        <p:spPr bwMode="auto">
+          <a:xfrm rot="0" flipH="0" flipV="0">
+            <a:off x="563366" y="1405630"/>
+            <a:ext cx="11053333" cy="5382087"/>
+          </a:xfrm>
+          <a:prstGeom prst="rect">
+            <a:avLst/>
+          </a:prstGeom>
+        </p:spPr>
+      </p:pic>
+    </p:spTree>
+  </p:cSld>
+  <p:clrMapOvr>
+    <a:masterClrMapping/>
+  </p:clrMapOvr>
+  <mc:AlternateContent xmlns:mc="http://schemas.openxmlformats.org/markup-compatibility/2006">
+    <mc:Choice xmlns:p14="http://schemas.microsoft.com/office/powerpoint/2010/main" Requires="p14">
+      <p:transition spd="med" p14:dur="800" advClick="1">
+        <p14:warp dir="in"/>
+      </p:transition>
+    </mc:Choice>
+    <mc:Fallback>
+      <p:transition spd="med" advClick="1">
+        <p:fade/>
+      </p:transition>
+    </mc:Fallback>
+  </mc:AlternateContent>
+</p:sld>
+</file>
+
+<file path=ppt/slides/slide13.xml><?xml version="1.0" encoding="utf-8"?>
+<p:sld xmlns:a="http://schemas.openxmlformats.org/drawingml/2006/main" xmlns:r="http://schemas.openxmlformats.org/officeDocument/2006/relationships" xmlns:p="http://schemas.openxmlformats.org/presentationml/2006/main" xmlns:m="http://schemas.openxmlformats.org/officeDocument/2006/math" xmlns:w="http://schemas.openxmlformats.org/wordprocessingml/2006/main" showMasterPhAnim="0" show="1">
+  <p:cSld name="">
+    <p:bg>
+      <p:bgPr shadeToTitle="0">
+        <a:blipFill>
+          <a:blip r:embed="rId2"/>
+          <a:stretch/>
+        </a:blipFill>
+      </p:bgPr>
+    </p:bg>
+    <p:spTree>
+      <p:nvGrpSpPr>
+        <p:cNvPr id="1" name="" hidden="0"/>
+        <p:cNvGrpSpPr/>
+        <p:nvPr isPhoto="0" userDrawn="0"/>
+      </p:nvGrpSpPr>
+      <p:grpSpPr bwMode="auto">
+        <a:xfrm>
+          <a:off x="0" y="0"/>
+          <a:ext cx="0" cy="0"/>
+          <a:chOff x="0" y="0"/>
+          <a:chExt cx="0" cy="0"/>
+        </a:xfrm>
+      </p:grpSpPr>
+      <p:sp>
+        <p:nvSpPr>
+          <p:cNvPr id="4" name="Title 1" hidden="0"/>
+          <p:cNvSpPr>
+            <a:spLocks noGrp="1"/>
+          </p:cNvSpPr>
+          <p:nvPr isPhoto="0" userDrawn="0">
+            <p:ph type="title" hasCustomPrompt="0"/>
+          </p:nvPr>
+        </p:nvSpPr>
+        <p:spPr bwMode="auto"/>
+        <p:txBody>
+          <a:bodyPr/>
+          <a:lstStyle/>
+          <a:p>
+            <a:pPr>
+              <a:defRPr/>
+            </a:pPr>
+            <a:r>
+              <a:rPr/>
+              <a:t>        Affichage de la note</a:t>
+            </a:r>
+            <a:endParaRPr/>
+          </a:p>
+        </p:txBody>
+      </p:sp>
+      <p:pic>
+        <p:nvPicPr>
+          <p:cNvPr id="5" name="" hidden="0"/>
+          <p:cNvPicPr>
+            <a:picLocks noChangeAspect="1"/>
+          </p:cNvPicPr>
+          <p:nvPr isPhoto="0" userDrawn="0">
+            <p:ph idx="1" hasCustomPrompt="0"/>
+          </p:nvPr>
+        </p:nvPicPr>
+        <p:blipFill>
+          <a:blip r:embed="rId3"/>
+          <a:stretch/>
+        </p:blipFill>
+        <p:spPr bwMode="auto">
+          <a:xfrm rot="0" flipH="0" flipV="0">
+            <a:off x="1097402" y="2154684"/>
+            <a:ext cx="10414074" cy="3551067"/>
+          </a:xfrm>
+          <a:prstGeom prst="rect">
+            <a:avLst/>
+          </a:prstGeom>
+        </p:spPr>
+      </p:pic>
+    </p:spTree>
+  </p:cSld>
+  <p:clrMapOvr>
+    <a:masterClrMapping/>
+  </p:clrMapOvr>
+  <mc:AlternateContent xmlns:mc="http://schemas.openxmlformats.org/markup-compatibility/2006">
+    <mc:Choice xmlns:p14="http://schemas.microsoft.com/office/powerpoint/2010/main" Requires="p14">
+      <p:transition spd="med" p14:dur="800" advClick="1">
+        <p14:warp dir="in"/>
+      </p:transition>
+    </mc:Choice>
+    <mc:Fallback>
+      <p:transition spd="med" advClick="1">
+        <p:fade/>
+      </p:transition>
+    </mc:Fallback>
+  </mc:AlternateContent>
+</p:sld>
+</file>
+
+<file path=ppt/slides/slide14.xml><?xml version="1.0" encoding="utf-8"?>
+<p:sld xmlns:a="http://schemas.openxmlformats.org/drawingml/2006/main" xmlns:r="http://schemas.openxmlformats.org/officeDocument/2006/relationships" xmlns:p="http://schemas.openxmlformats.org/presentationml/2006/main" xmlns:m="http://schemas.openxmlformats.org/officeDocument/2006/math" xmlns:w="http://schemas.openxmlformats.org/wordprocessingml/2006/main" showMasterPhAnim="0" show="1">
+  <p:cSld name="">
+    <p:bg>
+      <p:bgPr shadeToTitle="0">
+        <a:blipFill>
+          <a:blip r:embed="rId2"/>
+          <a:stretch/>
+        </a:blipFill>
+      </p:bgPr>
+    </p:bg>
+    <p:spTree>
+      <p:nvGrpSpPr>
+        <p:cNvPr id="1" name="" hidden="0"/>
+        <p:cNvGrpSpPr/>
+        <p:nvPr isPhoto="0" userDrawn="0"/>
+      </p:nvGrpSpPr>
+      <p:grpSpPr bwMode="auto">
+        <a:xfrm>
+          <a:off x="0" y="0"/>
+          <a:ext cx="0" cy="0"/>
+          <a:chOff x="0" y="0"/>
+          <a:chExt cx="0" cy="0"/>
+        </a:xfrm>
+      </p:grpSpPr>
+      <p:sp>
+        <p:nvSpPr>
+          <p:cNvPr id="4" name="Title 1" hidden="0"/>
+          <p:cNvSpPr>
+            <a:spLocks noGrp="1"/>
+          </p:cNvSpPr>
+          <p:nvPr isPhoto="0" userDrawn="0">
+            <p:ph type="title" hasCustomPrompt="0"/>
+          </p:nvPr>
+        </p:nvSpPr>
+        <p:spPr bwMode="auto"/>
+        <p:txBody>
+          <a:bodyPr/>
+          <a:lstStyle/>
+          <a:p>
+            <a:pPr>
+              <a:defRPr/>
+            </a:pPr>
+            <a:r>
+              <a:rPr/>
+              <a:t>        Exécution du programme</a:t>
+            </a:r>
+            <a:endParaRPr/>
+          </a:p>
+        </p:txBody>
+      </p:sp>
+      <p:pic>
+        <p:nvPicPr>
+          <p:cNvPr id="5" name="" hidden="0"/>
+          <p:cNvPicPr>
+            <a:picLocks noChangeAspect="1"/>
+          </p:cNvPicPr>
+          <p:nvPr isPhoto="0" userDrawn="0">
+            <p:ph idx="1" hasCustomPrompt="0"/>
+          </p:nvPr>
+        </p:nvPicPr>
+        <p:blipFill>
+          <a:blip r:embed="rId3"/>
+          <a:stretch/>
+        </p:blipFill>
+        <p:spPr bwMode="auto">
+          <a:xfrm rot="0" flipH="0" flipV="0">
+            <a:off x="3439036" y="3329125"/>
+            <a:ext cx="5858925" cy="1229927"/>
+          </a:xfrm>
+          <a:prstGeom prst="rect">
+            <a:avLst/>
+          </a:prstGeom>
+        </p:spPr>
+      </p:pic>
+    </p:spTree>
+  </p:cSld>
+  <p:clrMapOvr>
+    <a:masterClrMapping/>
+  </p:clrMapOvr>
+  <mc:AlternateContent xmlns:mc="http://schemas.openxmlformats.org/markup-compatibility/2006">
+    <mc:Choice xmlns:p14="http://schemas.microsoft.com/office/powerpoint/2010/main" Requires="p14">
+      <p:transition spd="med" p14:dur="800" advClick="1">
+        <p14:warp dir="in"/>
+      </p:transition>
+    </mc:Choice>
+    <mc:Fallback>
+      <p:transition spd="med" advClick="1">
+        <p:fade/>
+      </p:transition>
+    </mc:Fallback>
+  </mc:AlternateContent>
+</p:sld>
+</file>
+
+<file path=ppt/slides/slide15.xml><?xml version="1.0" encoding="utf-8"?>
+<p:sld xmlns:a="http://schemas.openxmlformats.org/drawingml/2006/main" xmlns:r="http://schemas.openxmlformats.org/officeDocument/2006/relationships" xmlns:p="http://schemas.openxmlformats.org/presentationml/2006/main" xmlns:m="http://schemas.openxmlformats.org/officeDocument/2006/math" xmlns:w="http://schemas.openxmlformats.org/wordprocessingml/2006/main" showMasterPhAnim="0" show="1">
+  <p:cSld name="">
+    <p:bg>
+      <p:bgPr shadeToTitle="0">
+        <a:blipFill>
+          <a:blip r:embed="rId3"/>
+          <a:stretch/>
+        </a:blipFill>
+      </p:bgPr>
+    </p:bg>
+    <p:spTree>
+      <p:nvGrpSpPr>
+        <p:cNvPr id="1" name="" hidden="0"/>
+        <p:cNvGrpSpPr/>
+        <p:nvPr isPhoto="0" userDrawn="0"/>
+      </p:nvGrpSpPr>
+      <p:grpSpPr bwMode="auto">
+        <a:xfrm>
+          <a:off x="0" y="0"/>
+          <a:ext cx="0" cy="0"/>
+          <a:chOff x="0" y="0"/>
+          <a:chExt cx="0" cy="0"/>
+        </a:xfrm>
+      </p:grpSpPr>
+      <p:sp>
+        <p:nvSpPr>
+          <p:cNvPr id="4" name="Title 1" hidden="0"/>
+          <p:cNvSpPr>
+            <a:spLocks noGrp="1"/>
+          </p:cNvSpPr>
+          <p:nvPr isPhoto="0" userDrawn="0">
+            <p:ph type="title" hasCustomPrompt="0"/>
+          </p:nvPr>
+        </p:nvSpPr>
+        <p:spPr bwMode="auto">
+          <a:xfrm>
+            <a:off x="831849" y="1709737"/>
+            <a:ext cx="10515600" cy="2852736"/>
+          </a:xfrm>
+        </p:spPr>
+        <p:txBody>
+          <a:bodyPr anchor="b"/>
+          <a:lstStyle>
+            <a:lvl1pPr>
+              <a:defRPr sz="6000"/>
+            </a:lvl1pPr>
+          </a:lstStyle>
+          <a:p>
+            <a:pPr>
+              <a:defRPr/>
+            </a:pPr>
+            <a:r>
+              <a:rPr/>
+              <a:t>Merci de votre attention !</a:t>
+            </a:r>
+            <a:endParaRPr/>
+          </a:p>
+        </p:txBody>
+      </p:sp>
+      <p:sp>
+        <p:nvSpPr>
+          <p:cNvPr id="5" name="Text Placeholder 2" hidden="0"/>
+          <p:cNvSpPr>
+            <a:spLocks noGrp="1"/>
+          </p:cNvSpPr>
+          <p:nvPr isPhoto="0" userDrawn="0">
+            <p:ph type="body" idx="1" hasCustomPrompt="0"/>
+          </p:nvPr>
+        </p:nvSpPr>
+        <p:spPr bwMode="auto">
+          <a:xfrm>
+            <a:off x="831849" y="4589462"/>
+            <a:ext cx="10515600" cy="1500186"/>
+          </a:xfrm>
+        </p:spPr>
+        <p:txBody>
+          <a:bodyPr/>
+          <a:lstStyle>
+            <a:lvl1pPr marL="0" indent="0">
+              <a:buNone/>
+              <a:defRPr sz="2400">
+                <a:solidFill>
+                  <a:schemeClr val="tx1">
+                    <a:tint val="75000"/>
+                  </a:schemeClr>
+                </a:solidFill>
+              </a:defRPr>
+            </a:lvl1pPr>
+            <a:lvl2pPr marL="457200" indent="0">
+              <a:buNone/>
+              <a:defRPr sz="2000">
+                <a:solidFill>
+                  <a:schemeClr val="tx1">
+                    <a:tint val="75000"/>
+                  </a:schemeClr>
+                </a:solidFill>
+              </a:defRPr>
+            </a:lvl2pPr>
+            <a:lvl3pPr marL="914400" indent="0">
+              <a:buNone/>
+              <a:defRPr sz="1800">
+                <a:solidFill>
+                  <a:schemeClr val="tx1">
+                    <a:tint val="75000"/>
+                  </a:schemeClr>
+                </a:solidFill>
+              </a:defRPr>
+            </a:lvl3pPr>
+            <a:lvl4pPr marL="1371600" indent="0">
+              <a:buNone/>
+              <a:defRPr sz="1600">
+                <a:solidFill>
+                  <a:schemeClr val="tx1">
+                    <a:tint val="75000"/>
+                  </a:schemeClr>
+                </a:solidFill>
+              </a:defRPr>
+            </a:lvl4pPr>
+            <a:lvl5pPr marL="1828800" indent="0">
+              <a:buNone/>
+              <a:defRPr sz="1600">
+                <a:solidFill>
+                  <a:schemeClr val="tx1">
+                    <a:tint val="75000"/>
+                  </a:schemeClr>
+                </a:solidFill>
+              </a:defRPr>
+            </a:lvl5pPr>
+            <a:lvl6pPr marL="2286000" indent="0">
+              <a:buNone/>
+              <a:defRPr sz="1600">
+                <a:solidFill>
+                  <a:schemeClr val="tx1">
+                    <a:tint val="75000"/>
+                  </a:schemeClr>
+                </a:solidFill>
+              </a:defRPr>
+            </a:lvl6pPr>
+            <a:lvl7pPr marL="2743200" indent="0">
+              <a:buNone/>
+              <a:defRPr sz="1600">
+                <a:solidFill>
+                  <a:schemeClr val="tx1">
+                    <a:tint val="75000"/>
+                  </a:schemeClr>
+                </a:solidFill>
+              </a:defRPr>
+            </a:lvl7pPr>
+            <a:lvl8pPr marL="3200400" indent="0">
+              <a:buNone/>
+              <a:defRPr sz="1600">
+                <a:solidFill>
+                  <a:schemeClr val="tx1">
+                    <a:tint val="75000"/>
+                  </a:schemeClr>
+                </a:solidFill>
+              </a:defRPr>
+            </a:lvl8pPr>
+            <a:lvl9pPr marL="3657600" indent="0">
+              <a:buNone/>
+              <a:defRPr sz="1600">
+                <a:solidFill>
+                  <a:schemeClr val="tx1">
+                    <a:tint val="75000"/>
+                  </a:schemeClr>
+                </a:solidFill>
+              </a:defRPr>
+            </a:lvl9pPr>
+          </a:lstStyle>
+          <a:p>
+            <a:pPr>
+              <a:defRPr/>
+            </a:pPr>
+            <a:endParaRPr/>
+          </a:p>
+          <a:p>
+            <a:pPr>
+              <a:defRPr/>
+            </a:pPr>
+            <a:endParaRPr/>
+          </a:p>
+        </p:txBody>
+      </p:sp>
+    </p:spTree>
+  </p:cSld>
+  <p:clrMapOvr>
+    <a:masterClrMapping/>
+  </p:clrMapOvr>
+  <mc:AlternateContent xmlns:mc="http://schemas.openxmlformats.org/markup-compatibility/2006">
+    <mc:Choice xmlns:p14="http://schemas.microsoft.com/office/powerpoint/2010/main" Requires="p14">
+      <p:transition spd="med" p14:dur="800" advClick="1">
+        <p14:warp dir="in"/>
+      </p:transition>
+    </mc:Choice>
+    <mc:Fallback>
+      <p:transition spd="med" advClick="1">
+        <p:fade/>
+      </p:transition>
+    </mc:Fallback>
+  </mc:AlternateContent>
+</p:sld>
+</file>
+
 <file path=ppt/slides/slide2.xml><?xml version="1.0" encoding="utf-8"?>
 <p:sld xmlns:a="http://schemas.openxmlformats.org/drawingml/2006/main" xmlns:r="http://schemas.openxmlformats.org/officeDocument/2006/relationships" xmlns:p="http://schemas.openxmlformats.org/presentationml/2006/main" xmlns:m="http://schemas.openxmlformats.org/officeDocument/2006/math" xmlns:w="http://schemas.openxmlformats.org/wordprocessingml/2006/main" showMasterPhAnim="0" show="1">
   <p:cSld name="">
@@ -7756,7 +8441,7 @@
     <p:bg>
       <p:bgPr shadeToTitle="0">
         <a:blipFill>
-          <a:blip r:embed="rId3"/>
+          <a:blip r:embed="rId2"/>
           <a:stretch/>
         </a:blipFill>
       </p:bgPr>
@@ -7785,155 +8470,46 @@
             <p:ph type="title" hasCustomPrompt="0"/>
           </p:nvPr>
         </p:nvSpPr>
+        <p:spPr bwMode="auto"/>
+        <p:txBody>
+          <a:bodyPr/>
+          <a:lstStyle/>
+          <a:p>
+            <a:pPr>
+              <a:defRPr/>
+            </a:pPr>
+            <a:r>
+              <a:rPr/>
+              <a:t>        Début du fichier</a:t>
+            </a:r>
+            <a:endParaRPr/>
+          </a:p>
+        </p:txBody>
+      </p:sp>
+      <p:pic>
+        <p:nvPicPr>
+          <p:cNvPr id="5" name="" hidden="0"/>
+          <p:cNvPicPr>
+            <a:picLocks noChangeAspect="1"/>
+          </p:cNvPicPr>
+          <p:nvPr isPhoto="0" userDrawn="0">
+            <p:ph idx="1" hasCustomPrompt="0"/>
+          </p:nvPr>
+        </p:nvPicPr>
+        <p:blipFill>
+          <a:blip r:embed="rId3"/>
+          <a:stretch/>
+        </p:blipFill>
         <p:spPr bwMode="auto">
-          <a:xfrm>
-            <a:off x="831849" y="1709737"/>
-            <a:ext cx="10515600" cy="2852736"/>
+          <a:xfrm rot="0" flipH="0" flipV="0">
+            <a:off x="869856" y="2237912"/>
+            <a:ext cx="10354702" cy="3560315"/>
           </a:xfrm>
+          <a:prstGeom prst="rect">
+            <a:avLst/>
+          </a:prstGeom>
         </p:spPr>
-        <p:txBody>
-          <a:bodyPr anchor="b"/>
-          <a:lstStyle>
-            <a:lvl1pPr>
-              <a:defRPr sz="6000"/>
-            </a:lvl1pPr>
-          </a:lstStyle>
-          <a:p>
-            <a:pPr>
-              <a:defRPr/>
-            </a:pPr>
-            <a:r>
-              <a:rPr/>
-              <a:t>Merci de votre attention !</a:t>
-            </a:r>
-            <a:endParaRPr/>
-          </a:p>
-        </p:txBody>
-      </p:sp>
-      <p:sp>
-        <p:nvSpPr>
-          <p:cNvPr id="5" name="Text Placeholder 2" hidden="0"/>
-          <p:cNvSpPr>
-            <a:spLocks noGrp="1"/>
-          </p:cNvSpPr>
-          <p:nvPr isPhoto="0" userDrawn="0">
-            <p:ph type="body" idx="1" hasCustomPrompt="0"/>
-          </p:nvPr>
-        </p:nvSpPr>
-        <p:spPr bwMode="auto">
-          <a:xfrm>
-            <a:off x="831849" y="4589462"/>
-            <a:ext cx="10515600" cy="1500186"/>
-          </a:xfrm>
-        </p:spPr>
-        <p:txBody>
-          <a:bodyPr/>
-          <a:lstStyle>
-            <a:lvl1pPr marL="0" indent="0">
-              <a:buNone/>
-              <a:defRPr sz="2400">
-                <a:solidFill>
-                  <a:schemeClr val="tx1">
-                    <a:tint val="75000"/>
-                  </a:schemeClr>
-                </a:solidFill>
-              </a:defRPr>
-            </a:lvl1pPr>
-            <a:lvl2pPr marL="457200" indent="0">
-              <a:buNone/>
-              <a:defRPr sz="2000">
-                <a:solidFill>
-                  <a:schemeClr val="tx1">
-                    <a:tint val="75000"/>
-                  </a:schemeClr>
-                </a:solidFill>
-              </a:defRPr>
-            </a:lvl2pPr>
-            <a:lvl3pPr marL="914400" indent="0">
-              <a:buNone/>
-              <a:defRPr sz="1800">
-                <a:solidFill>
-                  <a:schemeClr val="tx1">
-                    <a:tint val="75000"/>
-                  </a:schemeClr>
-                </a:solidFill>
-              </a:defRPr>
-            </a:lvl3pPr>
-            <a:lvl4pPr marL="1371600" indent="0">
-              <a:buNone/>
-              <a:defRPr sz="1600">
-                <a:solidFill>
-                  <a:schemeClr val="tx1">
-                    <a:tint val="75000"/>
-                  </a:schemeClr>
-                </a:solidFill>
-              </a:defRPr>
-            </a:lvl4pPr>
-            <a:lvl5pPr marL="1828800" indent="0">
-              <a:buNone/>
-              <a:defRPr sz="1600">
-                <a:solidFill>
-                  <a:schemeClr val="tx1">
-                    <a:tint val="75000"/>
-                  </a:schemeClr>
-                </a:solidFill>
-              </a:defRPr>
-            </a:lvl5pPr>
-            <a:lvl6pPr marL="2286000" indent="0">
-              <a:buNone/>
-              <a:defRPr sz="1600">
-                <a:solidFill>
-                  <a:schemeClr val="tx1">
-                    <a:tint val="75000"/>
-                  </a:schemeClr>
-                </a:solidFill>
-              </a:defRPr>
-            </a:lvl6pPr>
-            <a:lvl7pPr marL="2743200" indent="0">
-              <a:buNone/>
-              <a:defRPr sz="1600">
-                <a:solidFill>
-                  <a:schemeClr val="tx1">
-                    <a:tint val="75000"/>
-                  </a:schemeClr>
-                </a:solidFill>
-              </a:defRPr>
-            </a:lvl7pPr>
-            <a:lvl8pPr marL="3200400" indent="0">
-              <a:buNone/>
-              <a:defRPr sz="1600">
-                <a:solidFill>
-                  <a:schemeClr val="tx1">
-                    <a:tint val="75000"/>
-                  </a:schemeClr>
-                </a:solidFill>
-              </a:defRPr>
-            </a:lvl8pPr>
-            <a:lvl9pPr marL="3657600" indent="0">
-              <a:buNone/>
-              <a:defRPr sz="1600">
-                <a:solidFill>
-                  <a:schemeClr val="tx1">
-                    <a:tint val="75000"/>
-                  </a:schemeClr>
-                </a:solidFill>
-              </a:defRPr>
-            </a:lvl9pPr>
-          </a:lstStyle>
-          <a:p>
-            <a:pPr>
-              <a:defRPr/>
-            </a:pPr>
-            <a:endParaRPr/>
-          </a:p>
-          <a:p>
-            <a:pPr>
-              <a:defRPr/>
-            </a:pPr>
-            <a:endParaRPr/>
-          </a:p>
-        </p:txBody>
-      </p:sp>
+      </p:pic>
     </p:spTree>
   </p:cSld>
   <p:clrMapOvr>

</xml_diff>

<commit_message>
Add a diapo "Python VS C#"
</commit_message>
<xml_diff>
--- a/present_python.pptx
+++ b/present_python.pptx
@@ -5,7 +5,7 @@
     <p:sldMasterId id="2147483648" r:id="rId1"/>
   </p:sldMasterIdLst>
   <p:notesMasterIdLst>
-    <p:notesMasterId r:id="rId19"/>
+    <p:notesMasterId r:id="rId20"/>
   </p:notesMasterIdLst>
   <p:sldIdLst>
     <p:sldId id="256" r:id="rId4"/>
@@ -23,6 +23,7 @@
     <p:sldId id="268" r:id="rId16"/>
     <p:sldId id="269" r:id="rId17"/>
     <p:sldId id="270" r:id="rId18"/>
+    <p:sldId id="271" r:id="rId19"/>
   </p:sldIdLst>
   <p:sldSz cx="12192000" cy="6858000"/>
   <p:notesSz cx="6858000" cy="12192000"/>
@@ -5292,7 +5293,7 @@
             </a:pPr>
             <a:r>
               <a:rPr/>
-              <a:t>        Choix de la difficulté</a:t>
+              <a:t>        Début du fichier</a:t>
             </a:r>
             <a:endParaRPr/>
           </a:p>
@@ -5314,8 +5315,8 @@
         </p:blipFill>
         <p:spPr bwMode="auto">
           <a:xfrm rot="0" flipH="0" flipV="0">
-            <a:off x="1541052" y="1387135"/>
-            <a:ext cx="9062340" cy="5400582"/>
+            <a:off x="869856" y="2237912"/>
+            <a:ext cx="10354702" cy="3560315"/>
           </a:xfrm>
           <a:prstGeom prst="rect">
             <a:avLst/>
@@ -5387,7 +5388,7 @@
             </a:pPr>
             <a:r>
               <a:rPr/>
-              <a:t>        Quelques commentaires</a:t>
+              <a:t>        Choix de la difficulté</a:t>
             </a:r>
             <a:endParaRPr/>
           </a:p>
@@ -5409,8 +5410,8 @@
         </p:blipFill>
         <p:spPr bwMode="auto">
           <a:xfrm rot="0" flipH="0" flipV="0">
-            <a:off x="130332" y="3116431"/>
-            <a:ext cx="11954600" cy="1766286"/>
+            <a:off x="1541052" y="1387135"/>
+            <a:ext cx="9062340" cy="5400582"/>
           </a:xfrm>
           <a:prstGeom prst="rect">
             <a:avLst/>
@@ -5482,7 +5483,7 @@
             </a:pPr>
             <a:r>
               <a:rPr/>
-              <a:t>        Affichage des calculs</a:t>
+              <a:t>        Quelques commentaires</a:t>
             </a:r>
             <a:endParaRPr/>
           </a:p>
@@ -5504,8 +5505,8 @@
         </p:blipFill>
         <p:spPr bwMode="auto">
           <a:xfrm rot="0" flipH="0" flipV="0">
-            <a:off x="563366" y="1405630"/>
-            <a:ext cx="11053333" cy="5382087"/>
+            <a:off x="130332" y="3116431"/>
+            <a:ext cx="11954599" cy="1766286"/>
           </a:xfrm>
           <a:prstGeom prst="rect">
             <a:avLst/>
@@ -5577,7 +5578,7 @@
             </a:pPr>
             <a:r>
               <a:rPr/>
-              <a:t>        Affichage de la note</a:t>
+              <a:t>        Affichage des calculs</a:t>
             </a:r>
             <a:endParaRPr/>
           </a:p>
@@ -5599,8 +5600,8 @@
         </p:blipFill>
         <p:spPr bwMode="auto">
           <a:xfrm rot="0" flipH="0" flipV="0">
-            <a:off x="1097402" y="2154684"/>
-            <a:ext cx="10414074" cy="3551067"/>
+            <a:off x="563366" y="1405630"/>
+            <a:ext cx="11053333" cy="5382087"/>
           </a:xfrm>
           <a:prstGeom prst="rect">
             <a:avLst/>
@@ -5672,6 +5673,101 @@
             </a:pPr>
             <a:r>
               <a:rPr/>
+              <a:t>        Affichage de la note</a:t>
+            </a:r>
+            <a:endParaRPr/>
+          </a:p>
+        </p:txBody>
+      </p:sp>
+      <p:pic>
+        <p:nvPicPr>
+          <p:cNvPr id="5" name="" hidden="0"/>
+          <p:cNvPicPr>
+            <a:picLocks noChangeAspect="1"/>
+          </p:cNvPicPr>
+          <p:nvPr isPhoto="0" userDrawn="0">
+            <p:ph idx="1" hasCustomPrompt="0"/>
+          </p:nvPr>
+        </p:nvPicPr>
+        <p:blipFill>
+          <a:blip r:embed="rId3"/>
+          <a:stretch/>
+        </p:blipFill>
+        <p:spPr bwMode="auto">
+          <a:xfrm rot="0" flipH="0" flipV="0">
+            <a:off x="1097402" y="2154684"/>
+            <a:ext cx="10414074" cy="3551067"/>
+          </a:xfrm>
+          <a:prstGeom prst="rect">
+            <a:avLst/>
+          </a:prstGeom>
+        </p:spPr>
+      </p:pic>
+    </p:spTree>
+  </p:cSld>
+  <p:clrMapOvr>
+    <a:masterClrMapping/>
+  </p:clrMapOvr>
+  <mc:AlternateContent xmlns:mc="http://schemas.openxmlformats.org/markup-compatibility/2006">
+    <mc:Choice xmlns:p14="http://schemas.microsoft.com/office/powerpoint/2010/main" Requires="p14">
+      <p:transition spd="med" p14:dur="800" advClick="1">
+        <p14:warp dir="in"/>
+      </p:transition>
+    </mc:Choice>
+    <mc:Fallback>
+      <p:transition spd="med" advClick="1">
+        <p:fade/>
+      </p:transition>
+    </mc:Fallback>
+  </mc:AlternateContent>
+</p:sld>
+</file>
+
+<file path=ppt/slides/slide15.xml><?xml version="1.0" encoding="utf-8"?>
+<p:sld xmlns:a="http://schemas.openxmlformats.org/drawingml/2006/main" xmlns:r="http://schemas.openxmlformats.org/officeDocument/2006/relationships" xmlns:p="http://schemas.openxmlformats.org/presentationml/2006/main" xmlns:m="http://schemas.openxmlformats.org/officeDocument/2006/math" xmlns:w="http://schemas.openxmlformats.org/wordprocessingml/2006/main" showMasterPhAnim="0" show="1">
+  <p:cSld name="">
+    <p:bg>
+      <p:bgPr shadeToTitle="0">
+        <a:blipFill>
+          <a:blip r:embed="rId2"/>
+          <a:stretch/>
+        </a:blipFill>
+      </p:bgPr>
+    </p:bg>
+    <p:spTree>
+      <p:nvGrpSpPr>
+        <p:cNvPr id="1" name="" hidden="0"/>
+        <p:cNvGrpSpPr/>
+        <p:nvPr isPhoto="0" userDrawn="0"/>
+      </p:nvGrpSpPr>
+      <p:grpSpPr bwMode="auto">
+        <a:xfrm>
+          <a:off x="0" y="0"/>
+          <a:ext cx="0" cy="0"/>
+          <a:chOff x="0" y="0"/>
+          <a:chExt cx="0" cy="0"/>
+        </a:xfrm>
+      </p:grpSpPr>
+      <p:sp>
+        <p:nvSpPr>
+          <p:cNvPr id="4" name="Title 1" hidden="0"/>
+          <p:cNvSpPr>
+            <a:spLocks noGrp="1"/>
+          </p:cNvSpPr>
+          <p:nvPr isPhoto="0" userDrawn="0">
+            <p:ph type="title" hasCustomPrompt="0"/>
+          </p:nvPr>
+        </p:nvSpPr>
+        <p:spPr bwMode="auto"/>
+        <p:txBody>
+          <a:bodyPr/>
+          <a:lstStyle/>
+          <a:p>
+            <a:pPr>
+              <a:defRPr/>
+            </a:pPr>
+            <a:r>
+              <a:rPr/>
               <a:t>        Exécution du programme</a:t>
             </a:r>
             <a:endParaRPr/>
@@ -5722,7 +5818,7 @@
 </p:sld>
 </file>
 
-<file path=ppt/slides/slide15.xml><?xml version="1.0" encoding="utf-8"?>
+<file path=ppt/slides/slide16.xml><?xml version="1.0" encoding="utf-8"?>
 <p:sld xmlns:a="http://schemas.openxmlformats.org/drawingml/2006/main" xmlns:r="http://schemas.openxmlformats.org/officeDocument/2006/relationships" xmlns:p="http://schemas.openxmlformats.org/presentationml/2006/main" xmlns:m="http://schemas.openxmlformats.org/officeDocument/2006/math" xmlns:w="http://schemas.openxmlformats.org/wordprocessingml/2006/main" showMasterPhAnim="0" show="1">
   <p:cSld name="">
     <p:bg>
@@ -7004,7 +7100,7 @@
     <p:bg>
       <p:bgPr shadeToTitle="0">
         <a:blipFill>
-          <a:blip r:embed="rId3"/>
+          <a:blip r:embed="rId2"/>
           <a:stretch/>
         </a:blipFill>
       </p:bgPr>
@@ -7034,165 +7130,1101 @@
           </p:nvPr>
         </p:nvSpPr>
         <p:spPr bwMode="auto">
-          <a:xfrm>
-            <a:off x="831849" y="1709737"/>
-            <a:ext cx="10515600" cy="2852736"/>
+          <a:xfrm flipH="0" flipV="0">
+            <a:off x="838199" y="365124"/>
+            <a:ext cx="11166095" cy="1325562"/>
           </a:xfrm>
         </p:spPr>
         <p:txBody>
-          <a:bodyPr anchor="b"/>
-          <a:lstStyle>
-            <a:lvl1pPr>
-              <a:defRPr sz="6000"/>
-            </a:lvl1pPr>
-          </a:lstStyle>
+          <a:bodyPr/>
+          <a:lstStyle/>
           <a:p>
             <a:pPr>
               <a:defRPr/>
             </a:pPr>
             <a:r>
               <a:rPr/>
-              <a:t>Décryptons </a:t>
-            </a:r>
-            <a:r>
-              <a:rPr>
-                <a:solidFill>
-                  <a:schemeClr val="tx1">
-                    <a:lumMod val="50000"/>
-                    <a:lumOff val="50000"/>
-                  </a:schemeClr>
+              <a:t>        Simplicité du langage : Python VS C#</a:t>
+            </a:r>
+            <a:endParaRPr/>
+          </a:p>
+        </p:txBody>
+      </p:sp>
+      <p:sp>
+        <p:nvSpPr>
+          <p:cNvPr id="5" name="" hidden="0"/>
+          <p:cNvSpPr/>
+          <p:nvPr isPhoto="0" userDrawn="0"/>
+        </p:nvSpPr>
+        <p:spPr bwMode="auto">
+          <a:xfrm flipH="0" flipV="0">
+            <a:off x="186509" y="1868009"/>
+            <a:ext cx="4901825" cy="457235"/>
+          </a:xfrm>
+          <a:prstGeom prst="rect">
+            <a:avLst/>
+          </a:prstGeom>
+          <a:noFill/>
+        </p:spPr>
+        <p:txBody>
+          <a:bodyPr vertOverflow="overflow" horzOverflow="clip" vert="horz" wrap="square" lIns="91440" tIns="45720" rIns="91440" bIns="45720" numCol="1" spcCol="0" rtlCol="0" fromWordArt="0" anchor="t" anchorCtr="0" forceAA="0" upright="0" compatLnSpc="0">
+            <a:spAutoFit/>
+          </a:bodyPr>
+          <a:p>
+            <a:pPr>
+              <a:defRPr/>
+            </a:pPr>
+            <a:r>
+              <a:rPr sz="2400" b="1"/>
+              <a:t>Code Python :</a:t>
+            </a:r>
+            <a:endParaRPr sz="2400" b="1"/>
+          </a:p>
+        </p:txBody>
+      </p:sp>
+      <p:sp>
+        <p:nvSpPr>
+          <p:cNvPr id="6" name="" hidden="0"/>
+          <p:cNvSpPr/>
+          <p:nvPr isPhoto="0" userDrawn="0"/>
+        </p:nvSpPr>
+        <p:spPr bwMode="auto">
+          <a:xfrm flipH="0" flipV="0">
+            <a:off x="5550102" y="1881362"/>
+            <a:ext cx="4466577" cy="443883"/>
+          </a:xfrm>
+          <a:prstGeom prst="rect">
+            <a:avLst/>
+          </a:prstGeom>
+          <a:noFill/>
+        </p:spPr>
+        <p:txBody>
+          <a:bodyPr vertOverflow="overflow" horzOverflow="clip" vert="horz" wrap="square" lIns="91440" tIns="45720" rIns="91440" bIns="45720" numCol="1" spcCol="0" rtlCol="0" fromWordArt="0" anchor="t" anchorCtr="0" forceAA="0" upright="0" compatLnSpc="0">
+            <a:noAutofit/>
+          </a:bodyPr>
+          <a:p>
+            <a:pPr>
+              <a:defRPr/>
+            </a:pPr>
+            <a:r>
+              <a:rPr sz="2400" b="1"/>
+              <a:t>Code C# :</a:t>
+            </a:r>
+            <a:endParaRPr sz="2400" b="1"/>
+          </a:p>
+        </p:txBody>
+      </p:sp>
+      <p:sp>
+        <p:nvSpPr>
+          <p:cNvPr id="7" name="" hidden="0"/>
+          <p:cNvSpPr/>
+          <p:nvPr isPhoto="0" userDrawn="0"/>
+        </p:nvSpPr>
+        <p:spPr bwMode="auto">
+          <a:xfrm flipH="0" flipV="0">
+            <a:off x="168014" y="2506092"/>
+            <a:ext cx="5234126" cy="1463075"/>
+          </a:xfrm>
+          <a:prstGeom prst="rect">
+            <a:avLst/>
+          </a:prstGeom>
+          <a:solidFill>
+            <a:schemeClr val="bg1">
+              <a:lumMod val="85000"/>
+            </a:schemeClr>
+          </a:solidFill>
+        </p:spPr>
+        <p:txBody>
+          <a:bodyPr vertOverflow="overflow" horzOverflow="clip" vert="horz" wrap="square" lIns="91440" tIns="45720" rIns="91440" bIns="45720" numCol="1" spcCol="0" rtlCol="0" fromWordArt="0" anchor="t" anchorCtr="0" forceAA="0" upright="0" compatLnSpc="0">
+            <a:noAutofit/>
+          </a:bodyPr>
+          <a:p>
+            <a:pPr>
+              <a:defRPr/>
+            </a:pPr>
+            <a:r>
+              <a:rPr lang="fr-FR" sz="1800" b="0" i="0" u="none" strike="noStrike" cap="none" spc="0">
+                <a:solidFill>
+                  <a:srgbClr val="000000"/>
                 </a:solidFill>
                 <a:latin typeface="Consolas"/>
                 <a:ea typeface="Consolas"/>
                 <a:cs typeface="Consolas"/>
               </a:rPr>
-              <a:t>jeu_maths.py</a:t>
-            </a:r>
-            <a:endParaRPr/>
-          </a:p>
-        </p:txBody>
-      </p:sp>
-      <p:sp>
-        <p:nvSpPr>
-          <p:cNvPr id="5" name="Text Placeholder 2" hidden="0"/>
-          <p:cNvSpPr>
-            <a:spLocks noGrp="1"/>
-          </p:cNvSpPr>
-          <p:nvPr isPhoto="0" userDrawn="0">
-            <p:ph type="body" idx="1" hasCustomPrompt="0"/>
-          </p:nvPr>
+              <a:t>print(</a:t>
+            </a:r>
+            <a:r>
+              <a:rPr lang="fr-FR" sz="1800" b="0" i="0" u="none" strike="noStrike" cap="none" spc="0">
+                <a:solidFill>
+                  <a:srgbClr val="A31515"/>
+                </a:solidFill>
+                <a:latin typeface="Consolas"/>
+                <a:ea typeface="Consolas"/>
+                <a:cs typeface="Consolas"/>
+              </a:rPr>
+              <a:t>"</a:t>
+            </a:r>
+            <a:r>
+              <a:rPr lang="fr-FR" sz="1800" b="0" i="0" u="none" strike="noStrike" cap="none" spc="0">
+                <a:solidFill>
+                  <a:srgbClr val="A31515"/>
+                </a:solidFill>
+                <a:latin typeface="Consolas"/>
+                <a:ea typeface="Consolas"/>
+                <a:cs typeface="Consolas"/>
+              </a:rPr>
+              <a:t>Co</a:t>
+            </a:r>
+            <a:r>
+              <a:rPr lang="fr-FR" sz="1800" b="0" i="0" u="none" strike="noStrike" cap="none" spc="0">
+                <a:solidFill>
+                  <a:srgbClr val="A31515"/>
+                </a:solidFill>
+                <a:latin typeface="Consolas"/>
+                <a:ea typeface="Consolas"/>
+                <a:cs typeface="Consolas"/>
+              </a:rPr>
+              <a:t>mment </a:t>
+            </a:r>
+            <a:r>
+              <a:rPr lang="fr-FR" sz="1800" b="0" i="0" u="none" strike="noStrike" cap="none" spc="0">
+                <a:solidFill>
+                  <a:srgbClr val="A31515"/>
+                </a:solidFill>
+                <a:latin typeface="Consolas"/>
+                <a:ea typeface="Consolas"/>
+                <a:cs typeface="Consolas"/>
+              </a:rPr>
+              <a:t>t’appelles-tu ?"</a:t>
+            </a:r>
+            <a:r>
+              <a:rPr lang="fr-FR" sz="1800" b="0" i="0" u="none" strike="noStrike" cap="none" spc="0">
+                <a:solidFill>
+                  <a:srgbClr val="000000"/>
+                </a:solidFill>
+                <a:latin typeface="Consolas"/>
+                <a:ea typeface="Consolas"/>
+                <a:cs typeface="Consolas"/>
+              </a:rPr>
+              <a:t>)</a:t>
+            </a:r>
+            <a:endParaRPr sz="1800" b="0" i="0" u="none">
+              <a:solidFill>
+                <a:srgbClr val="000000"/>
+              </a:solidFill>
+              <a:latin typeface="Consolas"/>
+              <a:ea typeface="Consolas"/>
+              <a:cs typeface="Consolas"/>
+            </a:endParaRPr>
+          </a:p>
+          <a:p>
+            <a:pPr>
+              <a:defRPr/>
+            </a:pPr>
+            <a:r>
+              <a:rPr lang="fr-FR" sz="1800" b="0" i="0" u="none" strike="noStrike" cap="none" spc="0">
+                <a:solidFill>
+                  <a:srgbClr val="000000"/>
+                </a:solidFill>
+                <a:latin typeface="Consolas"/>
+                <a:ea typeface="Consolas"/>
+                <a:cs typeface="Consolas"/>
+              </a:rPr>
+              <a:t> </a:t>
+            </a:r>
+            <a:endParaRPr sz="1800" b="0" i="0" u="none">
+              <a:solidFill>
+                <a:srgbClr val="000000"/>
+              </a:solidFill>
+              <a:latin typeface="Consolas"/>
+              <a:ea typeface="Consolas"/>
+              <a:cs typeface="Consolas"/>
+            </a:endParaRPr>
+          </a:p>
+          <a:p>
+            <a:pPr>
+              <a:defRPr/>
+            </a:pPr>
+            <a:r>
+              <a:rPr lang="fr-FR" sz="1800" b="0" i="0" u="none" strike="noStrike" cap="none" spc="0">
+                <a:solidFill>
+                  <a:srgbClr val="000000"/>
+                </a:solidFill>
+                <a:latin typeface="Consolas"/>
+                <a:ea typeface="Consolas"/>
+                <a:cs typeface="Consolas"/>
+              </a:rPr>
+              <a:t>name = input()</a:t>
+            </a:r>
+            <a:endParaRPr sz="1800" b="0" i="0" u="none">
+              <a:solidFill>
+                <a:srgbClr val="000000"/>
+              </a:solidFill>
+              <a:latin typeface="Consolas"/>
+              <a:ea typeface="Consolas"/>
+              <a:cs typeface="Consolas"/>
+            </a:endParaRPr>
+          </a:p>
+          <a:p>
+            <a:pPr>
+              <a:defRPr/>
+            </a:pPr>
+            <a:r>
+              <a:rPr lang="fr-FR" sz="1800" b="0" i="0" u="none" strike="noStrike" cap="none" spc="0">
+                <a:solidFill>
+                  <a:srgbClr val="000000"/>
+                </a:solidFill>
+                <a:latin typeface="Consolas"/>
+                <a:ea typeface="Consolas"/>
+                <a:cs typeface="Consolas"/>
+              </a:rPr>
+              <a:t> </a:t>
+            </a:r>
+            <a:endParaRPr sz="1800" b="0" i="0" u="none">
+              <a:solidFill>
+                <a:srgbClr val="000000"/>
+              </a:solidFill>
+              <a:latin typeface="Consolas"/>
+              <a:ea typeface="Consolas"/>
+              <a:cs typeface="Consolas"/>
+            </a:endParaRPr>
+          </a:p>
+          <a:p>
+            <a:pPr>
+              <a:defRPr/>
+            </a:pPr>
+            <a:r>
+              <a:rPr lang="fr-FR" sz="1800" b="0" i="0" u="none" strike="noStrike" cap="none" spc="0">
+                <a:solidFill>
+                  <a:srgbClr val="000000"/>
+                </a:solidFill>
+                <a:latin typeface="Consolas"/>
+                <a:ea typeface="Consolas"/>
+                <a:cs typeface="Consolas"/>
+              </a:rPr>
+              <a:t>print(</a:t>
+            </a:r>
+            <a:r>
+              <a:rPr lang="fr-FR" sz="1800" b="0" i="0" u="none" strike="noStrike" cap="none" spc="0">
+                <a:solidFill>
+                  <a:srgbClr val="A31515"/>
+                </a:solidFill>
+                <a:latin typeface="Consolas"/>
+                <a:ea typeface="Consolas"/>
+                <a:cs typeface="Consolas"/>
+              </a:rPr>
+              <a:t>"Salut, "</a:t>
+            </a:r>
+            <a:r>
+              <a:rPr lang="fr-FR" sz="1800" b="0" i="0" u="none" strike="noStrike" cap="none" spc="0">
+                <a:solidFill>
+                  <a:srgbClr val="000000"/>
+                </a:solidFill>
+                <a:latin typeface="Consolas"/>
+                <a:ea typeface="Consolas"/>
+                <a:cs typeface="Consolas"/>
+              </a:rPr>
+              <a:t> + name + </a:t>
+            </a:r>
+            <a:r>
+              <a:rPr lang="fr-FR" sz="1800" b="0" i="0" u="none" strike="noStrike" cap="none" spc="0">
+                <a:solidFill>
+                  <a:srgbClr val="A31515"/>
+                </a:solidFill>
+                <a:latin typeface="Consolas"/>
+                <a:ea typeface="Consolas"/>
+                <a:cs typeface="Consolas"/>
+              </a:rPr>
+              <a:t>" !"</a:t>
+            </a:r>
+            <a:r>
+              <a:rPr lang="fr-FR" sz="1800" b="0" i="0" u="none" strike="noStrike" cap="none" spc="0">
+                <a:solidFill>
+                  <a:srgbClr val="000000"/>
+                </a:solidFill>
+                <a:latin typeface="Consolas"/>
+                <a:ea typeface="Consolas"/>
+                <a:cs typeface="Consolas"/>
+              </a:rPr>
+              <a:t>)</a:t>
+            </a:r>
+            <a:endParaRPr sz="1800" b="0" i="0" u="none">
+              <a:solidFill>
+                <a:srgbClr val="000000"/>
+              </a:solidFill>
+              <a:latin typeface="Consolas"/>
+              <a:ea typeface="Consolas"/>
+              <a:cs typeface="Consolas"/>
+            </a:endParaRPr>
+          </a:p>
+        </p:txBody>
+      </p:sp>
+      <p:sp>
+        <p:nvSpPr>
+          <p:cNvPr id="8" name="" hidden="0"/>
+          <p:cNvSpPr/>
+          <p:nvPr isPhoto="0" userDrawn="0"/>
         </p:nvSpPr>
         <p:spPr bwMode="auto">
-          <a:xfrm>
-            <a:off x="831849" y="4589462"/>
-            <a:ext cx="10515600" cy="1500186"/>
+          <a:xfrm flipH="0" flipV="0">
+            <a:off x="5550102" y="2506092"/>
+            <a:ext cx="6241499" cy="3726771"/>
           </a:xfrm>
+          <a:prstGeom prst="rect">
+            <a:avLst/>
+          </a:prstGeom>
+          <a:solidFill>
+            <a:schemeClr val="bg1">
+              <a:lumMod val="85000"/>
+            </a:schemeClr>
+          </a:solidFill>
         </p:spPr>
         <p:txBody>
-          <a:bodyPr/>
-          <a:lstStyle>
-            <a:lvl1pPr marL="0" indent="0">
-              <a:buNone/>
-              <a:defRPr sz="2400">
-                <a:solidFill>
-                  <a:schemeClr val="tx1">
-                    <a:tint val="75000"/>
-                  </a:schemeClr>
-                </a:solidFill>
-              </a:defRPr>
-            </a:lvl1pPr>
-            <a:lvl2pPr marL="457200" indent="0">
-              <a:buNone/>
-              <a:defRPr sz="2000">
-                <a:solidFill>
-                  <a:schemeClr val="tx1">
-                    <a:tint val="75000"/>
-                  </a:schemeClr>
-                </a:solidFill>
-              </a:defRPr>
-            </a:lvl2pPr>
-            <a:lvl3pPr marL="914400" indent="0">
-              <a:buNone/>
-              <a:defRPr sz="1800">
-                <a:solidFill>
-                  <a:schemeClr val="tx1">
-                    <a:tint val="75000"/>
-                  </a:schemeClr>
-                </a:solidFill>
-              </a:defRPr>
-            </a:lvl3pPr>
-            <a:lvl4pPr marL="1371600" indent="0">
-              <a:buNone/>
-              <a:defRPr sz="1600">
-                <a:solidFill>
-                  <a:schemeClr val="tx1">
-                    <a:tint val="75000"/>
-                  </a:schemeClr>
-                </a:solidFill>
-              </a:defRPr>
-            </a:lvl4pPr>
-            <a:lvl5pPr marL="1828800" indent="0">
-              <a:buNone/>
-              <a:defRPr sz="1600">
-                <a:solidFill>
-                  <a:schemeClr val="tx1">
-                    <a:tint val="75000"/>
-                  </a:schemeClr>
-                </a:solidFill>
-              </a:defRPr>
-            </a:lvl5pPr>
-            <a:lvl6pPr marL="2286000" indent="0">
-              <a:buNone/>
-              <a:defRPr sz="1600">
-                <a:solidFill>
-                  <a:schemeClr val="tx1">
-                    <a:tint val="75000"/>
-                  </a:schemeClr>
-                </a:solidFill>
-              </a:defRPr>
-            </a:lvl6pPr>
-            <a:lvl7pPr marL="2743200" indent="0">
-              <a:buNone/>
-              <a:defRPr sz="1600">
-                <a:solidFill>
-                  <a:schemeClr val="tx1">
-                    <a:tint val="75000"/>
-                  </a:schemeClr>
-                </a:solidFill>
-              </a:defRPr>
-            </a:lvl7pPr>
-            <a:lvl8pPr marL="3200400" indent="0">
-              <a:buNone/>
-              <a:defRPr sz="1600">
-                <a:solidFill>
-                  <a:schemeClr val="tx1">
-                    <a:tint val="75000"/>
-                  </a:schemeClr>
-                </a:solidFill>
-              </a:defRPr>
-            </a:lvl8pPr>
-            <a:lvl9pPr marL="3657600" indent="0">
-              <a:buNone/>
-              <a:defRPr sz="1600">
-                <a:solidFill>
-                  <a:schemeClr val="tx1">
-                    <a:tint val="75000"/>
-                  </a:schemeClr>
-                </a:solidFill>
-              </a:defRPr>
-            </a:lvl9pPr>
-          </a:lstStyle>
-          <a:p>
-            <a:pPr>
-              <a:defRPr/>
-            </a:pPr>
-            <a:endParaRPr/>
-          </a:p>
-          <a:p>
-            <a:pPr>
-              <a:defRPr/>
-            </a:pPr>
-            <a:endParaRPr/>
+          <a:bodyPr vertOverflow="overflow" horzOverflow="clip" vert="horz" wrap="square" lIns="91440" tIns="45720" rIns="91440" bIns="45720" numCol="1" spcCol="0" rtlCol="0" fromWordArt="0" anchor="t" anchorCtr="0" forceAA="0" upright="0" compatLnSpc="0">
+            <a:noAutofit/>
+          </a:bodyPr>
+          <a:p>
+            <a:pPr>
+              <a:defRPr/>
+            </a:pPr>
+            <a:r>
+              <a:rPr sz="1500" b="0" i="0" u="none">
+                <a:solidFill>
+                  <a:srgbClr val="0000FF"/>
+                </a:solidFill>
+                <a:latin typeface="Consolas"/>
+                <a:ea typeface="Consolas"/>
+                <a:cs typeface="Consolas"/>
+              </a:rPr>
+              <a:t>using</a:t>
+            </a:r>
+            <a:r>
+              <a:rPr sz="1500" b="0" i="0" u="none">
+                <a:solidFill>
+                  <a:srgbClr val="000000"/>
+                </a:solidFill>
+                <a:latin typeface="Consolas"/>
+                <a:ea typeface="Consolas"/>
+                <a:cs typeface="Consolas"/>
+              </a:rPr>
+              <a:t> System ;</a:t>
+            </a:r>
+            <a:endParaRPr sz="1500" b="0" i="0" u="none">
+              <a:solidFill>
+                <a:srgbClr val="000000"/>
+              </a:solidFill>
+              <a:latin typeface="Consolas"/>
+              <a:ea typeface="Consolas"/>
+              <a:cs typeface="Consolas"/>
+            </a:endParaRPr>
+          </a:p>
+          <a:p>
+            <a:pPr>
+              <a:defRPr/>
+            </a:pPr>
+            <a:r>
+              <a:rPr sz="1500" b="0" i="0" u="none">
+                <a:solidFill>
+                  <a:srgbClr val="000000"/>
+                </a:solidFill>
+                <a:latin typeface="Consolas"/>
+                <a:ea typeface="Consolas"/>
+                <a:cs typeface="Consolas"/>
+              </a:rPr>
+              <a:t> </a:t>
+            </a:r>
+            <a:endParaRPr sz="1500" b="0" i="0" u="none">
+              <a:solidFill>
+                <a:srgbClr val="000000"/>
+              </a:solidFill>
+              <a:latin typeface="Consolas"/>
+              <a:ea typeface="Consolas"/>
+              <a:cs typeface="Consolas"/>
+            </a:endParaRPr>
+          </a:p>
+          <a:p>
+            <a:pPr>
+              <a:defRPr/>
+            </a:pPr>
+            <a:r>
+              <a:rPr sz="1500" b="0" i="0" u="none">
+                <a:solidFill>
+                  <a:srgbClr val="0000FF"/>
+                </a:solidFill>
+                <a:latin typeface="Consolas"/>
+                <a:ea typeface="Consolas"/>
+                <a:cs typeface="Consolas"/>
+              </a:rPr>
+              <a:t>namespace</a:t>
+            </a:r>
+            <a:r>
+              <a:rPr sz="1500" b="0" i="0" u="none">
+                <a:solidFill>
+                  <a:srgbClr val="000000"/>
+                </a:solidFill>
+                <a:latin typeface="Consolas"/>
+                <a:ea typeface="Consolas"/>
+                <a:cs typeface="Consolas"/>
+              </a:rPr>
+              <a:t> </a:t>
+            </a:r>
+            <a:r>
+              <a:rPr sz="1500" b="0" i="0" u="none">
+                <a:solidFill>
+                  <a:srgbClr val="A31515"/>
+                </a:solidFill>
+                <a:latin typeface="Consolas"/>
+                <a:ea typeface="Consolas"/>
+                <a:cs typeface="Consolas"/>
+              </a:rPr>
+              <a:t>QuelEstTonNom</a:t>
+            </a:r>
+            <a:endParaRPr sz="1500" b="0" i="0" u="none">
+              <a:solidFill>
+                <a:srgbClr val="A31515"/>
+              </a:solidFill>
+              <a:latin typeface="Consolas"/>
+              <a:ea typeface="Consolas"/>
+              <a:cs typeface="Consolas"/>
+            </a:endParaRPr>
+          </a:p>
+          <a:p>
+            <a:pPr>
+              <a:defRPr/>
+            </a:pPr>
+            <a:r>
+              <a:rPr sz="1500" b="0" i="0" u="none">
+                <a:solidFill>
+                  <a:srgbClr val="000000"/>
+                </a:solidFill>
+                <a:latin typeface="Consolas"/>
+                <a:ea typeface="Consolas"/>
+                <a:cs typeface="Consolas"/>
+              </a:rPr>
+              <a:t>{</a:t>
+            </a:r>
+            <a:endParaRPr sz="1500" b="0" i="0" u="none">
+              <a:solidFill>
+                <a:srgbClr val="000000"/>
+              </a:solidFill>
+              <a:latin typeface="Consolas"/>
+              <a:ea typeface="Consolas"/>
+              <a:cs typeface="Consolas"/>
+            </a:endParaRPr>
+          </a:p>
+          <a:p>
+            <a:pPr>
+              <a:defRPr/>
+            </a:pPr>
+            <a:r>
+              <a:rPr sz="1500" b="0" i="0" u="none">
+                <a:solidFill>
+                  <a:srgbClr val="0000FF"/>
+                </a:solidFill>
+                <a:latin typeface="Consolas"/>
+                <a:ea typeface="Consolas"/>
+                <a:cs typeface="Consolas"/>
+              </a:rPr>
+              <a:t>    class</a:t>
+            </a:r>
+            <a:r>
+              <a:rPr sz="1500" b="0" i="0" u="none">
+                <a:solidFill>
+                  <a:srgbClr val="000000"/>
+                </a:solidFill>
+                <a:latin typeface="Consolas"/>
+                <a:ea typeface="Consolas"/>
+                <a:cs typeface="Consolas"/>
+              </a:rPr>
+              <a:t> </a:t>
+            </a:r>
+            <a:r>
+              <a:rPr sz="1500" b="0" i="0" u="none">
+                <a:solidFill>
+                  <a:srgbClr val="A31515"/>
+                </a:solidFill>
+                <a:latin typeface="Consolas"/>
+                <a:ea typeface="Consolas"/>
+                <a:cs typeface="Consolas"/>
+              </a:rPr>
+              <a:t>Programm</a:t>
+            </a:r>
+            <a:endParaRPr sz="1500" b="0" i="0" u="none">
+              <a:solidFill>
+                <a:srgbClr val="000000"/>
+              </a:solidFill>
+              <a:latin typeface="Consolas"/>
+              <a:ea typeface="Consolas"/>
+              <a:cs typeface="Consolas"/>
+            </a:endParaRPr>
+          </a:p>
+          <a:p>
+            <a:pPr>
+              <a:defRPr/>
+            </a:pPr>
+            <a:r>
+              <a:rPr sz="1500" b="0" i="0" u="none">
+                <a:solidFill>
+                  <a:srgbClr val="000000"/>
+                </a:solidFill>
+                <a:latin typeface="Consolas"/>
+                <a:ea typeface="Consolas"/>
+                <a:cs typeface="Consolas"/>
+              </a:rPr>
+              <a:t>    {</a:t>
+            </a:r>
+            <a:endParaRPr sz="1500" b="0" i="0" u="none">
+              <a:solidFill>
+                <a:srgbClr val="000000"/>
+              </a:solidFill>
+              <a:latin typeface="Consolas"/>
+              <a:ea typeface="Consolas"/>
+              <a:cs typeface="Consolas"/>
+            </a:endParaRPr>
+          </a:p>
+          <a:p>
+            <a:pPr>
+              <a:defRPr/>
+            </a:pPr>
+            <a:r>
+              <a:rPr sz="1500" b="0" i="0" u="none">
+                <a:solidFill>
+                  <a:srgbClr val="0000FF"/>
+                </a:solidFill>
+                <a:latin typeface="Consolas"/>
+                <a:ea typeface="Consolas"/>
+                <a:cs typeface="Consolas"/>
+              </a:rPr>
+              <a:t>        static</a:t>
+            </a:r>
+            <a:r>
+              <a:rPr sz="1500" b="0" i="0" u="none">
+                <a:solidFill>
+                  <a:srgbClr val="000000"/>
+                </a:solidFill>
+                <a:latin typeface="Consolas"/>
+                <a:ea typeface="Consolas"/>
+                <a:cs typeface="Consolas"/>
+              </a:rPr>
+              <a:t> </a:t>
+            </a:r>
+            <a:r>
+              <a:rPr sz="1500" b="0" i="0" u="none">
+                <a:solidFill>
+                  <a:srgbClr val="0000FF"/>
+                </a:solidFill>
+                <a:latin typeface="Consolas"/>
+                <a:ea typeface="Consolas"/>
+                <a:cs typeface="Consolas"/>
+              </a:rPr>
+              <a:t>void</a:t>
+            </a:r>
+            <a:r>
+              <a:rPr sz="1500" b="0" i="0" u="none">
+                <a:solidFill>
+                  <a:srgbClr val="000000"/>
+                </a:solidFill>
+                <a:latin typeface="Consolas"/>
+                <a:ea typeface="Consolas"/>
+                <a:cs typeface="Consolas"/>
+              </a:rPr>
+              <a:t> </a:t>
+            </a:r>
+            <a:r>
+              <a:rPr sz="1500" b="0" i="0" u="none">
+                <a:solidFill>
+                  <a:srgbClr val="A31515"/>
+                </a:solidFill>
+                <a:latin typeface="Consolas"/>
+                <a:ea typeface="Consolas"/>
+                <a:cs typeface="Consolas"/>
+              </a:rPr>
+              <a:t>Main</a:t>
+            </a:r>
+            <a:r>
+              <a:rPr sz="1500" b="0" i="0" u="none">
+                <a:solidFill>
+                  <a:srgbClr val="000000"/>
+                </a:solidFill>
+                <a:latin typeface="Consolas"/>
+                <a:ea typeface="Consolas"/>
+                <a:cs typeface="Consolas"/>
+              </a:rPr>
+              <a:t>(</a:t>
+            </a:r>
+            <a:r>
+              <a:rPr sz="1500" b="0" i="0" u="none">
+                <a:solidFill>
+                  <a:srgbClr val="0000FF"/>
+                </a:solidFill>
+                <a:latin typeface="Consolas"/>
+                <a:ea typeface="Consolas"/>
+                <a:cs typeface="Consolas"/>
+              </a:rPr>
+              <a:t>string</a:t>
+            </a:r>
+            <a:r>
+              <a:rPr sz="1500" b="0" i="0" u="none">
+                <a:solidFill>
+                  <a:srgbClr val="000000"/>
+                </a:solidFill>
+                <a:latin typeface="Consolas"/>
+                <a:ea typeface="Consolas"/>
+                <a:cs typeface="Consolas"/>
+              </a:rPr>
+              <a:t>[] args</a:t>
+            </a:r>
+            <a:r>
+              <a:rPr sz="1500" b="0" i="0" u="none">
+                <a:solidFill>
+                  <a:srgbClr val="000000"/>
+                </a:solidFill>
+                <a:latin typeface="Consolas"/>
+                <a:ea typeface="Consolas"/>
+                <a:cs typeface="Consolas"/>
+              </a:rPr>
+              <a:t>)</a:t>
+            </a:r>
+            <a:endParaRPr sz="1500" b="0" i="0" u="none">
+              <a:solidFill>
+                <a:srgbClr val="000000"/>
+              </a:solidFill>
+              <a:latin typeface="Consolas"/>
+              <a:ea typeface="Consolas"/>
+              <a:cs typeface="Consolas"/>
+            </a:endParaRPr>
+          </a:p>
+          <a:p>
+            <a:pPr>
+              <a:defRPr/>
+            </a:pPr>
+            <a:r>
+              <a:rPr sz="1500" b="0" i="0" u="none">
+                <a:solidFill>
+                  <a:srgbClr val="000000"/>
+                </a:solidFill>
+                <a:latin typeface="Consolas"/>
+                <a:ea typeface="Consolas"/>
+                <a:cs typeface="Consolas"/>
+              </a:rPr>
+              <a:t>        {</a:t>
+            </a:r>
+            <a:endParaRPr sz="1500" b="0" i="0" u="none">
+              <a:solidFill>
+                <a:srgbClr val="000000"/>
+              </a:solidFill>
+              <a:latin typeface="Consolas"/>
+              <a:ea typeface="Consolas"/>
+              <a:cs typeface="Consolas"/>
+            </a:endParaRPr>
+          </a:p>
+          <a:p>
+            <a:pPr>
+              <a:defRPr/>
+            </a:pPr>
+            <a:r>
+              <a:rPr sz="1500" b="0" i="0" u="none">
+                <a:solidFill>
+                  <a:srgbClr val="000000"/>
+                </a:solidFill>
+                <a:latin typeface="Consolas"/>
+                <a:ea typeface="Consolas"/>
+                <a:cs typeface="Consolas"/>
+              </a:rPr>
+              <a:t>            Console.WriteLine(</a:t>
+            </a:r>
+            <a:r>
+              <a:rPr sz="1500" b="0" i="0" u="none">
+                <a:solidFill>
+                  <a:srgbClr val="A31515"/>
+                </a:solidFill>
+                <a:latin typeface="Consolas"/>
+                <a:ea typeface="Consolas"/>
+                <a:cs typeface="Consolas"/>
+              </a:rPr>
+              <a:t>"</a:t>
+            </a:r>
+            <a:r>
+              <a:rPr sz="1500" b="0" i="0" u="none">
+                <a:solidFill>
+                  <a:srgbClr val="A31515"/>
+                </a:solidFill>
+                <a:latin typeface="Consolas"/>
+                <a:ea typeface="Consolas"/>
+                <a:cs typeface="Consolas"/>
+              </a:rPr>
+              <a:t>Comment t’appelles-tu ?"</a:t>
+            </a:r>
+            <a:r>
+              <a:rPr sz="1500" b="0" i="0" u="none">
+                <a:solidFill>
+                  <a:srgbClr val="000000"/>
+                </a:solidFill>
+                <a:latin typeface="Consolas"/>
+                <a:ea typeface="Consolas"/>
+                <a:cs typeface="Consolas"/>
+              </a:rPr>
+              <a:t>);</a:t>
+            </a:r>
+            <a:endParaRPr sz="1500" b="0" i="0" u="none">
+              <a:solidFill>
+                <a:srgbClr val="000000"/>
+              </a:solidFill>
+              <a:latin typeface="Consolas"/>
+              <a:ea typeface="Consolas"/>
+              <a:cs typeface="Consolas"/>
+            </a:endParaRPr>
+          </a:p>
+          <a:p>
+            <a:pPr>
+              <a:defRPr/>
+            </a:pPr>
+            <a:r>
+              <a:rPr sz="1500" b="0" i="0" u="none">
+                <a:solidFill>
+                  <a:srgbClr val="000000"/>
+                </a:solidFill>
+                <a:latin typeface="Consolas"/>
+                <a:ea typeface="Consolas"/>
+                <a:cs typeface="Consolas"/>
+              </a:rPr>
+              <a:t>            </a:t>
+            </a:r>
+            <a:endParaRPr sz="1500" b="0" i="0" u="none">
+              <a:solidFill>
+                <a:srgbClr val="0000FF"/>
+              </a:solidFill>
+              <a:latin typeface="Consolas"/>
+              <a:ea typeface="Consolas"/>
+              <a:cs typeface="Consolas"/>
+            </a:endParaRPr>
+          </a:p>
+          <a:p>
+            <a:pPr>
+              <a:defRPr/>
+            </a:pPr>
+            <a:r>
+              <a:rPr sz="1500" b="0" i="0" u="none">
+                <a:solidFill>
+                  <a:srgbClr val="0000FF"/>
+                </a:solidFill>
+                <a:latin typeface="Consolas"/>
+                <a:ea typeface="Consolas"/>
+                <a:cs typeface="Consolas"/>
+              </a:rPr>
+              <a:t>            string</a:t>
+            </a:r>
+            <a:r>
+              <a:rPr sz="1500" b="0" i="0" u="none">
+                <a:solidFill>
+                  <a:srgbClr val="000000"/>
+                </a:solidFill>
+                <a:latin typeface="Consolas"/>
+                <a:ea typeface="Consolas"/>
+                <a:cs typeface="Consolas"/>
+              </a:rPr>
+              <a:t> name = Console.ReadLine();</a:t>
+            </a:r>
+            <a:endParaRPr sz="1500" b="0" i="0" u="none">
+              <a:solidFill>
+                <a:srgbClr val="000000"/>
+              </a:solidFill>
+              <a:latin typeface="Consolas"/>
+              <a:ea typeface="Consolas"/>
+              <a:cs typeface="Consolas"/>
+            </a:endParaRPr>
+          </a:p>
+          <a:p>
+            <a:pPr>
+              <a:defRPr/>
+            </a:pPr>
+            <a:r>
+              <a:rPr sz="1500" b="0" i="0" u="none">
+                <a:solidFill>
+                  <a:srgbClr val="000000"/>
+                </a:solidFill>
+                <a:latin typeface="Consolas"/>
+                <a:ea typeface="Consolas"/>
+                <a:cs typeface="Consolas"/>
+              </a:rPr>
+              <a:t>            </a:t>
+            </a:r>
+            <a:endParaRPr sz="1500" b="0" i="0" u="none">
+              <a:solidFill>
+                <a:srgbClr val="000000"/>
+              </a:solidFill>
+              <a:latin typeface="Consolas"/>
+              <a:ea typeface="Consolas"/>
+              <a:cs typeface="Consolas"/>
+            </a:endParaRPr>
+          </a:p>
+          <a:p>
+            <a:pPr>
+              <a:defRPr/>
+            </a:pPr>
+            <a:r>
+              <a:rPr sz="1500" b="0" i="0" u="none">
+                <a:solidFill>
+                  <a:srgbClr val="000000"/>
+                </a:solidFill>
+                <a:latin typeface="Consolas"/>
+                <a:ea typeface="Consolas"/>
+                <a:cs typeface="Consolas"/>
+              </a:rPr>
+              <a:t>            Console.WriteLine(</a:t>
+            </a:r>
+            <a:r>
+              <a:rPr sz="1500" b="0" i="0" u="none">
+                <a:solidFill>
+                  <a:srgbClr val="A31515"/>
+                </a:solidFill>
+                <a:latin typeface="Consolas"/>
+                <a:ea typeface="Consolas"/>
+                <a:cs typeface="Consolas"/>
+              </a:rPr>
+              <a:t>"Salut, "</a:t>
+            </a:r>
+            <a:r>
+              <a:rPr sz="1500" b="0" i="0" u="none">
+                <a:solidFill>
+                  <a:srgbClr val="000000"/>
+                </a:solidFill>
+                <a:latin typeface="Consolas"/>
+                <a:ea typeface="Consolas"/>
+                <a:cs typeface="Consolas"/>
+              </a:rPr>
+              <a:t> + name + </a:t>
+            </a:r>
+            <a:r>
+              <a:rPr sz="1500" b="0" i="0" u="none">
+                <a:solidFill>
+                  <a:srgbClr val="A31515"/>
+                </a:solidFill>
+                <a:latin typeface="Consolas"/>
+                <a:ea typeface="Consolas"/>
+                <a:cs typeface="Consolas"/>
+              </a:rPr>
+              <a:t>" !"</a:t>
+            </a:r>
+            <a:r>
+              <a:rPr sz="1500" b="0" i="0" u="none">
+                <a:solidFill>
+                  <a:srgbClr val="000000"/>
+                </a:solidFill>
+                <a:latin typeface="Consolas"/>
+                <a:ea typeface="Consolas"/>
+                <a:cs typeface="Consolas"/>
+              </a:rPr>
+              <a:t>);</a:t>
+            </a:r>
+            <a:endParaRPr sz="1500" b="0" i="0" u="none">
+              <a:solidFill>
+                <a:srgbClr val="000000"/>
+              </a:solidFill>
+              <a:latin typeface="Consolas"/>
+              <a:ea typeface="Consolas"/>
+              <a:cs typeface="Consolas"/>
+            </a:endParaRPr>
+          </a:p>
+          <a:p>
+            <a:pPr>
+              <a:defRPr/>
+            </a:pPr>
+            <a:r>
+              <a:rPr sz="1500" b="0" i="0" u="none">
+                <a:solidFill>
+                  <a:srgbClr val="000000"/>
+                </a:solidFill>
+                <a:latin typeface="Consolas"/>
+                <a:ea typeface="Consolas"/>
+                <a:cs typeface="Consolas"/>
+              </a:rPr>
+              <a:t>        }</a:t>
+            </a:r>
+            <a:endParaRPr sz="1500" b="0" i="0" u="none">
+              <a:solidFill>
+                <a:srgbClr val="000000"/>
+              </a:solidFill>
+              <a:latin typeface="Consolas"/>
+              <a:ea typeface="Consolas"/>
+              <a:cs typeface="Consolas"/>
+            </a:endParaRPr>
+          </a:p>
+          <a:p>
+            <a:pPr>
+              <a:defRPr/>
+            </a:pPr>
+            <a:r>
+              <a:rPr sz="1500" b="0" i="0" u="none">
+                <a:solidFill>
+                  <a:srgbClr val="000000"/>
+                </a:solidFill>
+                <a:latin typeface="Consolas"/>
+                <a:ea typeface="Consolas"/>
+                <a:cs typeface="Consolas"/>
+              </a:rPr>
+              <a:t>    }</a:t>
+            </a:r>
+            <a:endParaRPr sz="1500" b="0" i="0" u="none">
+              <a:solidFill>
+                <a:srgbClr val="000000"/>
+              </a:solidFill>
+              <a:latin typeface="Consolas"/>
+              <a:ea typeface="Consolas"/>
+              <a:cs typeface="Consolas"/>
+            </a:endParaRPr>
+          </a:p>
+          <a:p>
+            <a:pPr>
+              <a:defRPr/>
+            </a:pPr>
+            <a:r>
+              <a:rPr sz="1500" b="0" i="0" u="none">
+                <a:solidFill>
+                  <a:srgbClr val="000000"/>
+                </a:solidFill>
+                <a:latin typeface="Consolas"/>
+                <a:ea typeface="Consolas"/>
+                <a:cs typeface="Consolas"/>
+              </a:rPr>
+              <a:t>}</a:t>
+            </a:r>
+            <a:endParaRPr sz="1500" b="0" i="0" u="none">
+              <a:solidFill>
+                <a:srgbClr val="000000"/>
+              </a:solidFill>
+              <a:latin typeface="Consolas"/>
+              <a:ea typeface="Consolas"/>
+              <a:cs typeface="Consolas"/>
+            </a:endParaRPr>
+          </a:p>
+        </p:txBody>
+      </p:sp>
+      <p:sp>
+        <p:nvSpPr>
+          <p:cNvPr id="9" name="" hidden="0"/>
+          <p:cNvSpPr/>
+          <p:nvPr isPhoto="0" userDrawn="0"/>
+        </p:nvSpPr>
+        <p:spPr bwMode="auto">
+          <a:xfrm flipH="0" flipV="0">
+            <a:off x="250630" y="4189150"/>
+            <a:ext cx="4947955" cy="457235"/>
+          </a:xfrm>
+          <a:prstGeom prst="rect">
+            <a:avLst/>
+          </a:prstGeom>
+          <a:noFill/>
+        </p:spPr>
+        <p:txBody>
+          <a:bodyPr vertOverflow="overflow" horzOverflow="clip" vert="horz" wrap="square" lIns="91440" tIns="45720" rIns="91440" bIns="45720" numCol="1" spcCol="0" rtlCol="0" fromWordArt="0" anchor="t" anchorCtr="0" forceAA="0" upright="0" compatLnSpc="0">
+            <a:spAutoFit/>
+          </a:bodyPr>
+          <a:p>
+            <a:pPr>
+              <a:defRPr/>
+            </a:pPr>
+            <a:r>
+              <a:rPr sz="2400" b="1"/>
+              <a:t>Résultat :</a:t>
+            </a:r>
+            <a:endParaRPr sz="2400" b="1"/>
+          </a:p>
+        </p:txBody>
+      </p:sp>
+      <p:sp>
+        <p:nvSpPr>
+          <p:cNvPr id="10" name="" hidden="0"/>
+          <p:cNvSpPr/>
+          <p:nvPr isPhoto="0" userDrawn="0"/>
+        </p:nvSpPr>
+        <p:spPr bwMode="auto">
+          <a:xfrm flipH="0" flipV="0">
+            <a:off x="213640" y="4762499"/>
+            <a:ext cx="5187888" cy="1821771"/>
+          </a:xfrm>
+          <a:prstGeom prst="rect">
+            <a:avLst/>
+          </a:prstGeom>
+          <a:solidFill>
+            <a:schemeClr val="tx1"/>
+          </a:solidFill>
+        </p:spPr>
+        <p:txBody>
+          <a:bodyPr vertOverflow="overflow" horzOverflow="clip" vert="horz" wrap="square" lIns="91440" tIns="45720" rIns="91440" bIns="45720" numCol="1" spcCol="0" rtlCol="0" fromWordArt="0" anchor="t" anchorCtr="0" forceAA="0" upright="0" compatLnSpc="0">
+            <a:noAutofit/>
+          </a:bodyPr>
+          <a:p>
+            <a:pPr>
+              <a:defRPr/>
+            </a:pPr>
+            <a:r>
+              <a:rPr>
+                <a:solidFill>
+                  <a:schemeClr val="bg1"/>
+                </a:solidFill>
+                <a:latin typeface="Consolas"/>
+                <a:ea typeface="Consolas"/>
+                <a:cs typeface="Consolas"/>
+              </a:rPr>
+              <a:t>Comment t’appelles-tu ?</a:t>
+            </a:r>
+            <a:endParaRPr>
+              <a:solidFill>
+                <a:schemeClr val="bg1"/>
+              </a:solidFill>
+              <a:latin typeface="Consolas"/>
+              <a:ea typeface="Consolas"/>
+              <a:cs typeface="Consolas"/>
+            </a:endParaRPr>
+          </a:p>
+          <a:p>
+            <a:pPr>
+              <a:defRPr/>
+            </a:pPr>
+            <a:r>
+              <a:rPr>
+                <a:solidFill>
+                  <a:schemeClr val="bg1"/>
+                </a:solidFill>
+                <a:latin typeface="Consolas"/>
+                <a:ea typeface="Consolas"/>
+                <a:cs typeface="Consolas"/>
+              </a:rPr>
+              <a:t>Natan</a:t>
+            </a:r>
+            <a:endParaRPr>
+              <a:solidFill>
+                <a:schemeClr val="bg1"/>
+              </a:solidFill>
+              <a:latin typeface="Consolas"/>
+              <a:ea typeface="Consolas"/>
+              <a:cs typeface="Consolas"/>
+            </a:endParaRPr>
+          </a:p>
+          <a:p>
+            <a:pPr>
+              <a:defRPr/>
+            </a:pPr>
+            <a:r>
+              <a:rPr>
+                <a:solidFill>
+                  <a:schemeClr val="bg1"/>
+                </a:solidFill>
+                <a:latin typeface="Consolas"/>
+                <a:ea typeface="Consolas"/>
+                <a:cs typeface="Consolas"/>
+              </a:rPr>
+              <a:t>Salut, Natan !</a:t>
+            </a:r>
+            <a:endParaRPr>
+              <a:solidFill>
+                <a:schemeClr val="bg1"/>
+              </a:solidFill>
+              <a:latin typeface="Consolas"/>
+              <a:ea typeface="Consolas"/>
+              <a:cs typeface="Consolas"/>
+            </a:endParaRPr>
           </a:p>
         </p:txBody>
       </p:sp>
@@ -7217,6 +8249,224 @@
 </file>
 
 <file path=ppt/slides/slide7.xml><?xml version="1.0" encoding="utf-8"?>
+<p:sld xmlns:a="http://schemas.openxmlformats.org/drawingml/2006/main" xmlns:r="http://schemas.openxmlformats.org/officeDocument/2006/relationships" xmlns:p="http://schemas.openxmlformats.org/presentationml/2006/main" xmlns:m="http://schemas.openxmlformats.org/officeDocument/2006/math" xmlns:w="http://schemas.openxmlformats.org/wordprocessingml/2006/main" showMasterPhAnim="0" show="1">
+  <p:cSld name="">
+    <p:bg>
+      <p:bgPr shadeToTitle="0">
+        <a:blipFill>
+          <a:blip r:embed="rId3"/>
+          <a:stretch/>
+        </a:blipFill>
+      </p:bgPr>
+    </p:bg>
+    <p:spTree>
+      <p:nvGrpSpPr>
+        <p:cNvPr id="1" name="" hidden="0"/>
+        <p:cNvGrpSpPr/>
+        <p:nvPr isPhoto="0" userDrawn="0"/>
+      </p:nvGrpSpPr>
+      <p:grpSpPr bwMode="auto">
+        <a:xfrm>
+          <a:off x="0" y="0"/>
+          <a:ext cx="0" cy="0"/>
+          <a:chOff x="0" y="0"/>
+          <a:chExt cx="0" cy="0"/>
+        </a:xfrm>
+      </p:grpSpPr>
+      <p:sp>
+        <p:nvSpPr>
+          <p:cNvPr id="4" name="Title 1" hidden="0"/>
+          <p:cNvSpPr>
+            <a:spLocks noGrp="1"/>
+          </p:cNvSpPr>
+          <p:nvPr isPhoto="0" userDrawn="0">
+            <p:ph type="title" hasCustomPrompt="0"/>
+          </p:nvPr>
+        </p:nvSpPr>
+        <p:spPr bwMode="auto">
+          <a:xfrm>
+            <a:off x="831849" y="1709737"/>
+            <a:ext cx="10515600" cy="2852736"/>
+          </a:xfrm>
+        </p:spPr>
+        <p:txBody>
+          <a:bodyPr anchor="b"/>
+          <a:lstStyle>
+            <a:lvl1pPr>
+              <a:defRPr sz="6000"/>
+            </a:lvl1pPr>
+          </a:lstStyle>
+          <a:p>
+            <a:pPr>
+              <a:defRPr/>
+            </a:pPr>
+            <a:r>
+              <a:rPr/>
+              <a:t>Décryptons </a:t>
+            </a:r>
+            <a:r>
+              <a:rPr>
+                <a:solidFill>
+                  <a:schemeClr val="tx1">
+                    <a:lumMod val="50000"/>
+                    <a:lumOff val="50000"/>
+                  </a:schemeClr>
+                </a:solidFill>
+                <a:latin typeface="Consolas"/>
+                <a:ea typeface="Consolas"/>
+                <a:cs typeface="Consolas"/>
+              </a:rPr>
+              <a:t>jeu_maths.py</a:t>
+            </a:r>
+            <a:endParaRPr/>
+          </a:p>
+        </p:txBody>
+      </p:sp>
+      <p:sp>
+        <p:nvSpPr>
+          <p:cNvPr id="5" name="Text Placeholder 2" hidden="0"/>
+          <p:cNvSpPr>
+            <a:spLocks noGrp="1"/>
+          </p:cNvSpPr>
+          <p:nvPr isPhoto="0" userDrawn="0">
+            <p:ph type="body" idx="1" hasCustomPrompt="0"/>
+          </p:nvPr>
+        </p:nvSpPr>
+        <p:spPr bwMode="auto">
+          <a:xfrm>
+            <a:off x="831849" y="4589462"/>
+            <a:ext cx="10515600" cy="1500186"/>
+          </a:xfrm>
+        </p:spPr>
+        <p:txBody>
+          <a:bodyPr/>
+          <a:lstStyle>
+            <a:lvl1pPr marL="0" indent="0">
+              <a:buNone/>
+              <a:defRPr sz="2400">
+                <a:solidFill>
+                  <a:schemeClr val="tx1">
+                    <a:tint val="75000"/>
+                  </a:schemeClr>
+                </a:solidFill>
+              </a:defRPr>
+            </a:lvl1pPr>
+            <a:lvl2pPr marL="457200" indent="0">
+              <a:buNone/>
+              <a:defRPr sz="2000">
+                <a:solidFill>
+                  <a:schemeClr val="tx1">
+                    <a:tint val="75000"/>
+                  </a:schemeClr>
+                </a:solidFill>
+              </a:defRPr>
+            </a:lvl2pPr>
+            <a:lvl3pPr marL="914400" indent="0">
+              <a:buNone/>
+              <a:defRPr sz="1800">
+                <a:solidFill>
+                  <a:schemeClr val="tx1">
+                    <a:tint val="75000"/>
+                  </a:schemeClr>
+                </a:solidFill>
+              </a:defRPr>
+            </a:lvl3pPr>
+            <a:lvl4pPr marL="1371600" indent="0">
+              <a:buNone/>
+              <a:defRPr sz="1600">
+                <a:solidFill>
+                  <a:schemeClr val="tx1">
+                    <a:tint val="75000"/>
+                  </a:schemeClr>
+                </a:solidFill>
+              </a:defRPr>
+            </a:lvl4pPr>
+            <a:lvl5pPr marL="1828800" indent="0">
+              <a:buNone/>
+              <a:defRPr sz="1600">
+                <a:solidFill>
+                  <a:schemeClr val="tx1">
+                    <a:tint val="75000"/>
+                  </a:schemeClr>
+                </a:solidFill>
+              </a:defRPr>
+            </a:lvl5pPr>
+            <a:lvl6pPr marL="2286000" indent="0">
+              <a:buNone/>
+              <a:defRPr sz="1600">
+                <a:solidFill>
+                  <a:schemeClr val="tx1">
+                    <a:tint val="75000"/>
+                  </a:schemeClr>
+                </a:solidFill>
+              </a:defRPr>
+            </a:lvl6pPr>
+            <a:lvl7pPr marL="2743200" indent="0">
+              <a:buNone/>
+              <a:defRPr sz="1600">
+                <a:solidFill>
+                  <a:schemeClr val="tx1">
+                    <a:tint val="75000"/>
+                  </a:schemeClr>
+                </a:solidFill>
+              </a:defRPr>
+            </a:lvl7pPr>
+            <a:lvl8pPr marL="3200400" indent="0">
+              <a:buNone/>
+              <a:defRPr sz="1600">
+                <a:solidFill>
+                  <a:schemeClr val="tx1">
+                    <a:tint val="75000"/>
+                  </a:schemeClr>
+                </a:solidFill>
+              </a:defRPr>
+            </a:lvl8pPr>
+            <a:lvl9pPr marL="3657600" indent="0">
+              <a:buNone/>
+              <a:defRPr sz="1600">
+                <a:solidFill>
+                  <a:schemeClr val="tx1">
+                    <a:tint val="75000"/>
+                  </a:schemeClr>
+                </a:solidFill>
+              </a:defRPr>
+            </a:lvl9pPr>
+          </a:lstStyle>
+          <a:p>
+            <a:pPr>
+              <a:defRPr/>
+            </a:pPr>
+            <a:endParaRPr/>
+          </a:p>
+          <a:p>
+            <a:pPr>
+              <a:defRPr/>
+            </a:pPr>
+            <a:endParaRPr/>
+          </a:p>
+        </p:txBody>
+      </p:sp>
+    </p:spTree>
+  </p:cSld>
+  <p:clrMapOvr>
+    <a:masterClrMapping/>
+  </p:clrMapOvr>
+  <mc:AlternateContent xmlns:mc="http://schemas.openxmlformats.org/markup-compatibility/2006">
+    <mc:Choice xmlns:p14="http://schemas.microsoft.com/office/powerpoint/2010/main" Requires="p14">
+      <p:transition spd="med" p14:dur="800" advClick="1">
+        <p14:warp dir="in"/>
+      </p:transition>
+    </mc:Choice>
+    <mc:Fallback>
+      <p:transition spd="med" advClick="1">
+        <p:fade/>
+      </p:transition>
+    </mc:Fallback>
+  </mc:AlternateContent>
+</p:sld>
+</file>
+
+<file path=ppt/slides/slide8.xml><?xml version="1.0" encoding="utf-8"?>
 <p:sld xmlns:a="http://schemas.openxmlformats.org/drawingml/2006/main" xmlns:r="http://schemas.openxmlformats.org/officeDocument/2006/relationships" xmlns:p="http://schemas.openxmlformats.org/presentationml/2006/main" xmlns:m="http://schemas.openxmlformats.org/officeDocument/2006/math" xmlns:w="http://schemas.openxmlformats.org/wordprocessingml/2006/main" showMasterPhAnim="0" show="1">
   <p:cSld name="">
     <p:bg>
@@ -7943,7 +9193,7 @@
 </p:sld>
 </file>
 
-<file path=ppt/slides/slide8.xml><?xml version="1.0" encoding="utf-8"?>
+<file path=ppt/slides/slide9.xml><?xml version="1.0" encoding="utf-8"?>
 <p:sld xmlns:a="http://schemas.openxmlformats.org/drawingml/2006/main" xmlns:r="http://schemas.openxmlformats.org/officeDocument/2006/relationships" xmlns:p="http://schemas.openxmlformats.org/presentationml/2006/main" xmlns:m="http://schemas.openxmlformats.org/officeDocument/2006/math" xmlns:w="http://schemas.openxmlformats.org/wordprocessingml/2006/main" showMasterPhAnim="0" show="1">
   <p:cSld name="">
     <p:bg>
@@ -8415,101 +9665,6 @@
           </a:p>
         </p:txBody>
       </p:sp>
-    </p:spTree>
-  </p:cSld>
-  <p:clrMapOvr>
-    <a:masterClrMapping/>
-  </p:clrMapOvr>
-  <mc:AlternateContent xmlns:mc="http://schemas.openxmlformats.org/markup-compatibility/2006">
-    <mc:Choice xmlns:p14="http://schemas.microsoft.com/office/powerpoint/2010/main" Requires="p14">
-      <p:transition spd="med" p14:dur="800" advClick="1">
-        <p14:warp dir="in"/>
-      </p:transition>
-    </mc:Choice>
-    <mc:Fallback>
-      <p:transition spd="med" advClick="1">
-        <p:fade/>
-      </p:transition>
-    </mc:Fallback>
-  </mc:AlternateContent>
-</p:sld>
-</file>
-
-<file path=ppt/slides/slide9.xml><?xml version="1.0" encoding="utf-8"?>
-<p:sld xmlns:a="http://schemas.openxmlformats.org/drawingml/2006/main" xmlns:r="http://schemas.openxmlformats.org/officeDocument/2006/relationships" xmlns:p="http://schemas.openxmlformats.org/presentationml/2006/main" xmlns:m="http://schemas.openxmlformats.org/officeDocument/2006/math" xmlns:w="http://schemas.openxmlformats.org/wordprocessingml/2006/main" showMasterPhAnim="0" show="1">
-  <p:cSld name="">
-    <p:bg>
-      <p:bgPr shadeToTitle="0">
-        <a:blipFill>
-          <a:blip r:embed="rId2"/>
-          <a:stretch/>
-        </a:blipFill>
-      </p:bgPr>
-    </p:bg>
-    <p:spTree>
-      <p:nvGrpSpPr>
-        <p:cNvPr id="1" name="" hidden="0"/>
-        <p:cNvGrpSpPr/>
-        <p:nvPr isPhoto="0" userDrawn="0"/>
-      </p:nvGrpSpPr>
-      <p:grpSpPr bwMode="auto">
-        <a:xfrm>
-          <a:off x="0" y="0"/>
-          <a:ext cx="0" cy="0"/>
-          <a:chOff x="0" y="0"/>
-          <a:chExt cx="0" cy="0"/>
-        </a:xfrm>
-      </p:grpSpPr>
-      <p:sp>
-        <p:nvSpPr>
-          <p:cNvPr id="4" name="Title 1" hidden="0"/>
-          <p:cNvSpPr>
-            <a:spLocks noGrp="1"/>
-          </p:cNvSpPr>
-          <p:nvPr isPhoto="0" userDrawn="0">
-            <p:ph type="title" hasCustomPrompt="0"/>
-          </p:nvPr>
-        </p:nvSpPr>
-        <p:spPr bwMode="auto"/>
-        <p:txBody>
-          <a:bodyPr/>
-          <a:lstStyle/>
-          <a:p>
-            <a:pPr>
-              <a:defRPr/>
-            </a:pPr>
-            <a:r>
-              <a:rPr/>
-              <a:t>        Début du fichier</a:t>
-            </a:r>
-            <a:endParaRPr/>
-          </a:p>
-        </p:txBody>
-      </p:sp>
-      <p:pic>
-        <p:nvPicPr>
-          <p:cNvPr id="5" name="" hidden="0"/>
-          <p:cNvPicPr>
-            <a:picLocks noChangeAspect="1"/>
-          </p:cNvPicPr>
-          <p:nvPr isPhoto="0" userDrawn="0">
-            <p:ph idx="1" hasCustomPrompt="0"/>
-          </p:nvPr>
-        </p:nvPicPr>
-        <p:blipFill>
-          <a:blip r:embed="rId3"/>
-          <a:stretch/>
-        </p:blipFill>
-        <p:spPr bwMode="auto">
-          <a:xfrm rot="0" flipH="0" flipV="0">
-            <a:off x="869856" y="2237912"/>
-            <a:ext cx="10354702" cy="3560315"/>
-          </a:xfrm>
-          <a:prstGeom prst="rect">
-            <a:avLst/>
-          </a:prstGeom>
-        </p:spPr>
-      </p:pic>
     </p:spTree>
   </p:cSld>
   <p:clrMapOvr>

</xml_diff>

<commit_message>
Delete the execution diapo
</commit_message>
<xml_diff>
--- a/present_python.pptx
+++ b/present_python.pptx
@@ -5,7 +5,7 @@
     <p:sldMasterId id="2147483648" r:id="rId1"/>
   </p:sldMasterIdLst>
   <p:notesMasterIdLst>
-    <p:notesMasterId r:id="rId20"/>
+    <p:notesMasterId r:id="rId19"/>
   </p:notesMasterIdLst>
   <p:sldIdLst>
     <p:sldId id="256" r:id="rId4"/>
@@ -23,7 +23,6 @@
     <p:sldId id="268" r:id="rId16"/>
     <p:sldId id="269" r:id="rId17"/>
     <p:sldId id="270" r:id="rId18"/>
-    <p:sldId id="271" r:id="rId19"/>
   </p:sldIdLst>
   <p:sldSz cx="12192000" cy="6858000"/>
   <p:notesSz cx="6858000" cy="12192000"/>
@@ -5729,101 +5728,6 @@
     <p:bg>
       <p:bgPr shadeToTitle="0">
         <a:blipFill>
-          <a:blip r:embed="rId2"/>
-          <a:stretch/>
-        </a:blipFill>
-      </p:bgPr>
-    </p:bg>
-    <p:spTree>
-      <p:nvGrpSpPr>
-        <p:cNvPr id="1" name="" hidden="0"/>
-        <p:cNvGrpSpPr/>
-        <p:nvPr isPhoto="0" userDrawn="0"/>
-      </p:nvGrpSpPr>
-      <p:grpSpPr bwMode="auto">
-        <a:xfrm>
-          <a:off x="0" y="0"/>
-          <a:ext cx="0" cy="0"/>
-          <a:chOff x="0" y="0"/>
-          <a:chExt cx="0" cy="0"/>
-        </a:xfrm>
-      </p:grpSpPr>
-      <p:sp>
-        <p:nvSpPr>
-          <p:cNvPr id="4" name="Title 1" hidden="0"/>
-          <p:cNvSpPr>
-            <a:spLocks noGrp="1"/>
-          </p:cNvSpPr>
-          <p:nvPr isPhoto="0" userDrawn="0">
-            <p:ph type="title" hasCustomPrompt="0"/>
-          </p:nvPr>
-        </p:nvSpPr>
-        <p:spPr bwMode="auto"/>
-        <p:txBody>
-          <a:bodyPr/>
-          <a:lstStyle/>
-          <a:p>
-            <a:pPr>
-              <a:defRPr/>
-            </a:pPr>
-            <a:r>
-              <a:rPr/>
-              <a:t>        Exécution du programme</a:t>
-            </a:r>
-            <a:endParaRPr/>
-          </a:p>
-        </p:txBody>
-      </p:sp>
-      <p:pic>
-        <p:nvPicPr>
-          <p:cNvPr id="5" name="" hidden="0"/>
-          <p:cNvPicPr>
-            <a:picLocks noChangeAspect="1"/>
-          </p:cNvPicPr>
-          <p:nvPr isPhoto="0" userDrawn="0">
-            <p:ph idx="1" hasCustomPrompt="0"/>
-          </p:nvPr>
-        </p:nvPicPr>
-        <p:blipFill>
-          <a:blip r:embed="rId3"/>
-          <a:stretch/>
-        </p:blipFill>
-        <p:spPr bwMode="auto">
-          <a:xfrm rot="0" flipH="0" flipV="0">
-            <a:off x="3439036" y="3329125"/>
-            <a:ext cx="5858925" cy="1229927"/>
-          </a:xfrm>
-          <a:prstGeom prst="rect">
-            <a:avLst/>
-          </a:prstGeom>
-        </p:spPr>
-      </p:pic>
-    </p:spTree>
-  </p:cSld>
-  <p:clrMapOvr>
-    <a:masterClrMapping/>
-  </p:clrMapOvr>
-  <mc:AlternateContent xmlns:mc="http://schemas.openxmlformats.org/markup-compatibility/2006">
-    <mc:Choice xmlns:p14="http://schemas.microsoft.com/office/powerpoint/2010/main" Requires="p14">
-      <p:transition spd="med" p14:dur="800" advClick="1">
-        <p14:warp dir="in"/>
-      </p:transition>
-    </mc:Choice>
-    <mc:Fallback>
-      <p:transition spd="med" advClick="1">
-        <p:fade/>
-      </p:transition>
-    </mc:Fallback>
-  </mc:AlternateContent>
-</p:sld>
-</file>
-
-<file path=ppt/slides/slide16.xml><?xml version="1.0" encoding="utf-8"?>
-<p:sld xmlns:a="http://schemas.openxmlformats.org/drawingml/2006/main" xmlns:r="http://schemas.openxmlformats.org/officeDocument/2006/relationships" xmlns:p="http://schemas.openxmlformats.org/presentationml/2006/main" xmlns:m="http://schemas.openxmlformats.org/officeDocument/2006/math" xmlns:w="http://schemas.openxmlformats.org/wordprocessingml/2006/main" showMasterPhAnim="0" show="1">
-  <p:cSld name="">
-    <p:bg>
-      <p:bgPr shadeToTitle="0">
-        <a:blipFill>
           <a:blip r:embed="rId3"/>
           <a:stretch/>
         </a:blipFill>
@@ -7131,7 +7035,7 @@
         </p:nvSpPr>
         <p:spPr bwMode="auto">
           <a:xfrm flipH="0" flipV="0">
-            <a:off x="838199" y="365124"/>
+            <a:off x="838198" y="365124"/>
             <a:ext cx="11166095" cy="1325562"/>
           </a:xfrm>
         </p:spPr>
@@ -7222,7 +7126,7 @@
         </p:nvSpPr>
         <p:spPr bwMode="auto">
           <a:xfrm flipH="0" flipV="0">
-            <a:off x="168014" y="2506092"/>
+            <a:off x="168014" y="2506091"/>
             <a:ext cx="5234126" cy="1463075"/>
           </a:xfrm>
           <a:prstGeom prst="rect">
@@ -7467,7 +7371,7 @@
         </p:nvSpPr>
         <p:spPr bwMode="auto">
           <a:xfrm flipH="0" flipV="0">
-            <a:off x="5550102" y="2506092"/>
+            <a:off x="5550102" y="2506091"/>
             <a:ext cx="6241499" cy="3726771"/>
           </a:xfrm>
           <a:prstGeom prst="rect">

</xml_diff>